<commit_message>
Enhane Layout a bit
</commit_message>
<xml_diff>
--- a/report/gis.pptx
+++ b/report/gis.pptx
@@ -6,7 +6,7 @@
     <p:sldMasterId id="2147483684" r:id="rId2"/>
   </p:sldMasterIdLst>
   <p:notesMasterIdLst>
-    <p:notesMasterId r:id="rId27"/>
+    <p:notesMasterId r:id="rId28"/>
   </p:notesMasterIdLst>
   <p:sldIdLst>
     <p:sldId id="256" r:id="rId3"/>
@@ -24,15 +24,16 @@
     <p:sldId id="260" r:id="rId15"/>
     <p:sldId id="259" r:id="rId16"/>
     <p:sldId id="258" r:id="rId17"/>
-    <p:sldId id="261" r:id="rId18"/>
-    <p:sldId id="270" r:id="rId19"/>
-    <p:sldId id="262" r:id="rId20"/>
-    <p:sldId id="278" r:id="rId21"/>
-    <p:sldId id="263" r:id="rId22"/>
-    <p:sldId id="267" r:id="rId23"/>
-    <p:sldId id="264" r:id="rId24"/>
-    <p:sldId id="268" r:id="rId25"/>
-    <p:sldId id="269" r:id="rId26"/>
+    <p:sldId id="281" r:id="rId18"/>
+    <p:sldId id="261" r:id="rId19"/>
+    <p:sldId id="270" r:id="rId20"/>
+    <p:sldId id="262" r:id="rId21"/>
+    <p:sldId id="278" r:id="rId22"/>
+    <p:sldId id="263" r:id="rId23"/>
+    <p:sldId id="267" r:id="rId24"/>
+    <p:sldId id="264" r:id="rId25"/>
+    <p:sldId id="268" r:id="rId26"/>
+    <p:sldId id="269" r:id="rId27"/>
   </p:sldIdLst>
   <p:sldSz cx="12192000" cy="6858000"/>
   <p:notesSz cx="6858000" cy="9144000"/>
@@ -131,6 +132,11 @@
       </a:defRPr>
     </a:lvl9pPr>
   </p:defaultTextStyle>
+  <p:extLst>
+    <p:ext uri="{EFAFB233-063F-42B5-8137-9DF3F51BA10A}">
+      <p15:sldGuideLst xmlns:p15="http://schemas.microsoft.com/office/powerpoint/2012/main"/>
+    </p:ext>
+  </p:extLst>
 </p:presentation>
 </file>
 
@@ -216,7 +222,7 @@
           <a:p>
             <a:fld id="{FEE2D91A-1683-4123-AF92-4A5DC6719218}" type="datetimeFigureOut">
               <a:rPr lang="en-DE" smtClean="0"/>
-              <a:t>24.01.2020</a:t>
+              <a:t>01/26/2020</a:t>
             </a:fld>
             <a:endParaRPr lang="en-DE"/>
           </a:p>
@@ -633,7 +639,7 @@
           <a:p>
             <a:fld id="{4119134C-8F60-47B5-AFFD-D58A362655B7}" type="datetimeFigureOut">
               <a:rPr lang="en-DE" smtClean="0"/>
-              <a:t>23.01.2020</a:t>
+              <a:t>01/26/2020</a:t>
             </a:fld>
             <a:endParaRPr lang="en-DE"/>
           </a:p>
@@ -873,7 +879,7 @@
           <a:p>
             <a:fld id="{8C5402B3-8912-402D-B4F2-05138AECB4D3}" type="datetime8">
               <a:rPr lang="en-DE" smtClean="0"/>
-              <a:t>24.01.2020 14:20</a:t>
+              <a:t>01/26/2020 15:22</a:t>
             </a:fld>
             <a:endParaRPr lang="en-DE"/>
           </a:p>
@@ -1119,7 +1125,7 @@
           <a:p>
             <a:fld id="{40E76BE1-FAD0-43ED-A3C4-08C070C07792}" type="datetime8">
               <a:rPr lang="en-DE" smtClean="0"/>
-              <a:t>24.01.2020 14:20</a:t>
+              <a:t>01/26/2020 15:22</a:t>
             </a:fld>
             <a:endParaRPr lang="en-DE"/>
           </a:p>
@@ -1454,7 +1460,7 @@
           <a:p>
             <a:fld id="{4119134C-8F60-47B5-AFFD-D58A362655B7}" type="datetimeFigureOut">
               <a:rPr lang="en-DE" smtClean="0"/>
-              <a:t>23.01.2020</a:t>
+              <a:t>01/26/2020</a:t>
             </a:fld>
             <a:endParaRPr lang="en-DE"/>
           </a:p>
@@ -1706,7 +1712,7 @@
           <a:p>
             <a:fld id="{4119134C-8F60-47B5-AFFD-D58A362655B7}" type="datetimeFigureOut">
               <a:rPr lang="en-DE" smtClean="0"/>
-              <a:t>23.01.2020</a:t>
+              <a:t>01/26/2020</a:t>
             </a:fld>
             <a:endParaRPr lang="en-DE"/>
           </a:p>
@@ -2089,7 +2095,7 @@
           <a:p>
             <a:fld id="{4119134C-8F60-47B5-AFFD-D58A362655B7}" type="datetimeFigureOut">
               <a:rPr lang="en-DE" smtClean="0"/>
-              <a:t>23.01.2020</a:t>
+              <a:t>01/26/2020</a:t>
             </a:fld>
             <a:endParaRPr lang="en-DE"/>
           </a:p>
@@ -2448,7 +2454,7 @@
           <a:p>
             <a:fld id="{076DCF85-E0F7-4869-85F3-711D8A901070}" type="datetime8">
               <a:rPr lang="en-DE" smtClean="0"/>
-              <a:t>24.01.2020 14:20</a:t>
+              <a:t>01/26/2020 15:22</a:t>
             </a:fld>
             <a:endParaRPr lang="en-DE"/>
           </a:p>
@@ -2863,7 +2869,7 @@
           <a:p>
             <a:fld id="{B6E83429-925F-41BA-A12E-2CFA48DD4CC1}" type="datetime8">
               <a:rPr lang="en-DE" smtClean="0"/>
-              <a:t>24.01.2020 14:20</a:t>
+              <a:t>01/26/2020 15:22</a:t>
             </a:fld>
             <a:endParaRPr lang="en-DE"/>
           </a:p>
@@ -3017,7 +3023,7 @@
           <a:p>
             <a:fld id="{27CA40CA-EC9E-47A7-A339-48FED9960FE6}" type="datetime8">
               <a:rPr lang="en-DE" smtClean="0"/>
-              <a:t>24.01.2020 14:20</a:t>
+              <a:t>01/26/2020 15:22</a:t>
             </a:fld>
             <a:endParaRPr lang="en-DE"/>
           </a:p>
@@ -3224,7 +3230,7 @@
           <a:p>
             <a:fld id="{0A889F15-8A21-4312-8D84-98D37BF31CD5}" type="datetime8">
               <a:rPr lang="en-DE" smtClean="0"/>
-              <a:t>24.01.2020 14:20</a:t>
+              <a:t>01/26/2020 15:22</a:t>
             </a:fld>
             <a:endParaRPr lang="en-DE"/>
           </a:p>
@@ -3614,7 +3620,7 @@
           <a:p>
             <a:fld id="{3F19DDDB-49EE-465A-A327-E997A5C9A6D2}" type="datetime8">
               <a:rPr lang="en-DE" smtClean="0"/>
-              <a:t>24.01.2020 14:20</a:t>
+              <a:t>01/26/2020 15:22</a:t>
             </a:fld>
             <a:endParaRPr lang="en-DE"/>
           </a:p>
@@ -3859,7 +3865,7 @@
           <a:p>
             <a:fld id="{4119134C-8F60-47B5-AFFD-D58A362655B7}" type="datetimeFigureOut">
               <a:rPr lang="en-DE" smtClean="0"/>
-              <a:t>23.01.2020</a:t>
+              <a:t>01/26/2020</a:t>
             </a:fld>
             <a:endParaRPr lang="en-DE"/>
           </a:p>
@@ -4272,7 +4278,7 @@
           <a:p>
             <a:fld id="{6A043931-D11B-4DD2-928E-F315D98D3038}" type="datetime8">
               <a:rPr lang="en-DE" smtClean="0"/>
-              <a:t>24.01.2020 14:20</a:t>
+              <a:t>01/26/2020 15:22</a:t>
             </a:fld>
             <a:endParaRPr lang="en-DE"/>
           </a:p>
@@ -4478,7 +4484,7 @@
           <a:p>
             <a:fld id="{8C5402B3-8912-402D-B4F2-05138AECB4D3}" type="datetime8">
               <a:rPr lang="en-DE" smtClean="0"/>
-              <a:t>24.01.2020 14:20</a:t>
+              <a:t>01/26/2020 15:22</a:t>
             </a:fld>
             <a:endParaRPr lang="en-DE"/>
           </a:p>
@@ -4770,7 +4776,7 @@
           <a:p>
             <a:fld id="{40E76BE1-FAD0-43ED-A3C4-08C070C07792}" type="datetime8">
               <a:rPr lang="en-DE" smtClean="0"/>
-              <a:t>24.01.2020 14:20</a:t>
+              <a:t>01/26/2020 15:22</a:t>
             </a:fld>
             <a:endParaRPr lang="en-DE"/>
           </a:p>
@@ -5070,7 +5076,7 @@
           <a:p>
             <a:fld id="{4119134C-8F60-47B5-AFFD-D58A362655B7}" type="datetimeFigureOut">
               <a:rPr lang="en-DE" smtClean="0"/>
-              <a:t>23.01.2020</a:t>
+              <a:t>01/26/2020</a:t>
             </a:fld>
             <a:endParaRPr lang="en-DE"/>
           </a:p>
@@ -5422,7 +5428,7 @@
           <a:p>
             <a:fld id="{076DCF85-E0F7-4869-85F3-711D8A901070}" type="datetime8">
               <a:rPr lang="en-DE" smtClean="0"/>
-              <a:t>24.01.2020 14:20</a:t>
+              <a:t>01/26/2020 15:22</a:t>
             </a:fld>
             <a:endParaRPr lang="en-DE"/>
           </a:p>
@@ -5873,7 +5879,7 @@
           <a:p>
             <a:fld id="{B6E83429-925F-41BA-A12E-2CFA48DD4CC1}" type="datetime8">
               <a:rPr lang="en-DE" smtClean="0"/>
-              <a:t>24.01.2020 14:20</a:t>
+              <a:t>01/26/2020 15:22</a:t>
             </a:fld>
             <a:endParaRPr lang="en-DE"/>
           </a:p>
@@ -6051,7 +6057,7 @@
           <a:p>
             <a:fld id="{27CA40CA-EC9E-47A7-A339-48FED9960FE6}" type="datetime8">
               <a:rPr lang="en-DE" smtClean="0"/>
-              <a:t>24.01.2020 14:20</a:t>
+              <a:t>01/26/2020 15:22</a:t>
             </a:fld>
             <a:endParaRPr lang="en-DE"/>
           </a:p>
@@ -6200,7 +6206,7 @@
           <a:p>
             <a:fld id="{0A889F15-8A21-4312-8D84-98D37BF31CD5}" type="datetime8">
               <a:rPr lang="en-DE" smtClean="0"/>
-              <a:t>24.01.2020 14:20</a:t>
+              <a:t>01/26/2020 15:22</a:t>
             </a:fld>
             <a:endParaRPr lang="en-DE"/>
           </a:p>
@@ -6549,7 +6555,7 @@
           <a:p>
             <a:fld id="{3F19DDDB-49EE-465A-A327-E997A5C9A6D2}" type="datetime8">
               <a:rPr lang="en-DE" smtClean="0"/>
-              <a:t>24.01.2020 14:20</a:t>
+              <a:t>01/26/2020 15:22</a:t>
             </a:fld>
             <a:endParaRPr lang="en-DE"/>
           </a:p>
@@ -6874,7 +6880,7 @@
           <a:p>
             <a:fld id="{6A043931-D11B-4DD2-928E-F315D98D3038}" type="datetime8">
               <a:rPr lang="en-DE" smtClean="0"/>
-              <a:t>24.01.2020 14:20</a:t>
+              <a:t>01/26/2020 15:22</a:t>
             </a:fld>
             <a:endParaRPr lang="en-DE"/>
           </a:p>
@@ -7153,7 +7159,7 @@
           <a:p>
             <a:fld id="{7AE8A171-FE66-440E-891D-965096C7196F}" type="datetime8">
               <a:rPr lang="en-DE" smtClean="0"/>
-              <a:t>24.01.2020 14:20</a:t>
+              <a:t>01/26/2020 15:22</a:t>
             </a:fld>
             <a:endParaRPr lang="en-DE"/>
           </a:p>
@@ -7816,7 +7822,7 @@
           <a:p>
             <a:fld id="{7AE8A171-FE66-440E-891D-965096C7196F}" type="datetime8">
               <a:rPr lang="en-DE" smtClean="0"/>
-              <a:t>24.01.2020 14:20</a:t>
+              <a:t>01/26/2020 15:22</a:t>
             </a:fld>
             <a:endParaRPr lang="en-DE"/>
           </a:p>
@@ -10507,7 +10513,7 @@
           <a:graphicData uri="http://schemas.openxmlformats.org/presentationml/2006/ole">
             <mc:AlternateContent xmlns:mc="http://schemas.openxmlformats.org/markup-compatibility/2006">
               <mc:Choice xmlns:v="urn:schemas-microsoft-com:vml" Requires="v">
-                <p:oleObj spid="_x0000_s2066" name="Document" r:id="rId3" imgW="5731560" imgH="3728880" progId="Word.OpenDocumentText.12">
+                <p:oleObj spid="_x0000_s2068" name="Document" r:id="rId3" imgW="5731560" imgH="3728880" progId="Word.OpenDocumentText.12">
                   <p:embed/>
                 </p:oleObj>
               </mc:Choice>
@@ -12498,7 +12504,7 @@
           <p:cNvPr id="2" name="Titel 1">
             <a:extLst>
               <a:ext uri="{FF2B5EF4-FFF2-40B4-BE49-F238E27FC236}">
-                <a16:creationId xmlns:a16="http://schemas.microsoft.com/office/drawing/2014/main" id="{920B986F-74B7-4C35-A29D-53A7D8985E8C}"/>
+                <a16:creationId xmlns:a16="http://schemas.microsoft.com/office/drawing/2014/main" id="{F936F80E-B105-461C-974F-8BB282B516B1}"/>
               </a:ext>
             </a:extLst>
           </p:cNvPr>
@@ -12514,15 +12520,7 @@
           <a:bodyPr/>
           <a:lstStyle/>
           <a:p>
-            <a:r>
-              <a:rPr lang="de-DE" dirty="0"/>
-              <a:t>Milestones so </a:t>
-            </a:r>
-            <a:r>
-              <a:rPr lang="de-DE" dirty="0" err="1"/>
-              <a:t>far</a:t>
-            </a:r>
-            <a:endParaRPr lang="en-DE" dirty="0"/>
+            <a:endParaRPr lang="en-US"/>
           </a:p>
         </p:txBody>
       </p:sp>
@@ -12531,7 +12529,7 @@
           <p:cNvPr id="3" name="Inhaltsplatzhalter 2">
             <a:extLst>
               <a:ext uri="{FF2B5EF4-FFF2-40B4-BE49-F238E27FC236}">
-                <a16:creationId xmlns:a16="http://schemas.microsoft.com/office/drawing/2014/main" id="{5714CDD2-0588-42E0-93C1-65CA540CA6AD}"/>
+                <a16:creationId xmlns:a16="http://schemas.microsoft.com/office/drawing/2014/main" id="{6D6439D0-05AD-4A24-BB4D-2449F40EB8FE}"/>
               </a:ext>
             </a:extLst>
           </p:cNvPr>
@@ -12547,252 +12545,7 @@
           <a:bodyPr/>
           <a:lstStyle/>
           <a:p>
-            <a:r>
-              <a:rPr lang="de-DE" dirty="0" err="1"/>
-              <a:t>Automated</a:t>
-            </a:r>
-            <a:r>
-              <a:rPr lang="de-DE" dirty="0"/>
-              <a:t> </a:t>
-            </a:r>
-            <a:r>
-              <a:rPr lang="de-DE" dirty="0" err="1"/>
-              <a:t>download</a:t>
-            </a:r>
-            <a:r>
-              <a:rPr lang="de-DE" dirty="0"/>
-              <a:t> </a:t>
-            </a:r>
-            <a:r>
-              <a:rPr lang="de-DE" dirty="0" err="1"/>
-              <a:t>of</a:t>
-            </a:r>
-            <a:r>
-              <a:rPr lang="de-DE" dirty="0"/>
-              <a:t> </a:t>
-            </a:r>
-            <a:r>
-              <a:rPr lang="de-DE" dirty="0" err="1"/>
-              <a:t>data</a:t>
-            </a:r>
-            <a:endParaRPr lang="de-DE" dirty="0"/>
-          </a:p>
-          <a:p>
-            <a:r>
-              <a:rPr lang="de-DE" dirty="0" err="1"/>
-              <a:t>Automated</a:t>
-            </a:r>
-            <a:r>
-              <a:rPr lang="de-DE" dirty="0"/>
-              <a:t> </a:t>
-            </a:r>
-            <a:r>
-              <a:rPr lang="de-DE" dirty="0" err="1"/>
-              <a:t>ingestion</a:t>
-            </a:r>
-            <a:r>
-              <a:rPr lang="de-DE" dirty="0"/>
-              <a:t> </a:t>
-            </a:r>
-            <a:r>
-              <a:rPr lang="de-DE" dirty="0" err="1"/>
-              <a:t>of</a:t>
-            </a:r>
-            <a:r>
-              <a:rPr lang="de-DE" dirty="0"/>
-              <a:t> </a:t>
-            </a:r>
-            <a:r>
-              <a:rPr lang="de-DE" dirty="0" err="1"/>
-              <a:t>data</a:t>
-            </a:r>
-            <a:r>
-              <a:rPr lang="de-DE" dirty="0"/>
-              <a:t> </a:t>
-            </a:r>
-            <a:r>
-              <a:rPr lang="de-DE" dirty="0" err="1"/>
-              <a:t>into</a:t>
-            </a:r>
-            <a:r>
-              <a:rPr lang="de-DE" dirty="0"/>
-              <a:t> </a:t>
-            </a:r>
-            <a:r>
-              <a:rPr lang="de-DE" dirty="0" err="1"/>
-              <a:t>database</a:t>
-            </a:r>
-            <a:endParaRPr lang="de-DE" dirty="0"/>
-          </a:p>
-          <a:p>
-            <a:r>
-              <a:rPr lang="de-DE" dirty="0" err="1"/>
-              <a:t>Automated</a:t>
-            </a:r>
-            <a:r>
-              <a:rPr lang="de-DE" dirty="0"/>
-              <a:t> </a:t>
-            </a:r>
-            <a:r>
-              <a:rPr lang="de-DE" dirty="0" err="1"/>
-              <a:t>parsing</a:t>
-            </a:r>
-            <a:r>
-              <a:rPr lang="de-DE" dirty="0"/>
-              <a:t> and </a:t>
-            </a:r>
-            <a:r>
-              <a:rPr lang="de-DE" dirty="0" err="1"/>
-              <a:t>filtering</a:t>
-            </a:r>
-            <a:r>
-              <a:rPr lang="de-DE" dirty="0"/>
-              <a:t> </a:t>
-            </a:r>
-            <a:r>
-              <a:rPr lang="de-DE" dirty="0" err="1"/>
-              <a:t>of</a:t>
-            </a:r>
-            <a:r>
-              <a:rPr lang="de-DE" dirty="0"/>
-              <a:t> extreme </a:t>
-            </a:r>
-            <a:r>
-              <a:rPr lang="de-DE" dirty="0" err="1"/>
-              <a:t>values</a:t>
-            </a:r>
-            <a:endParaRPr lang="de-DE" dirty="0"/>
-          </a:p>
-          <a:p>
-            <a:r>
-              <a:rPr lang="de-DE" dirty="0"/>
-              <a:t>Connection </a:t>
-            </a:r>
-            <a:r>
-              <a:rPr lang="de-DE" dirty="0" err="1"/>
-              <a:t>of</a:t>
-            </a:r>
-            <a:r>
-              <a:rPr lang="de-DE" dirty="0"/>
-              <a:t> GRASS GIS </a:t>
-            </a:r>
-            <a:r>
-              <a:rPr lang="de-DE" dirty="0" err="1"/>
-              <a:t>modules</a:t>
-            </a:r>
-            <a:r>
-              <a:rPr lang="de-DE" dirty="0"/>
-              <a:t> </a:t>
-            </a:r>
-            <a:r>
-              <a:rPr lang="de-DE" dirty="0" err="1"/>
-              <a:t>to</a:t>
-            </a:r>
-            <a:r>
-              <a:rPr lang="de-DE" dirty="0"/>
-              <a:t> </a:t>
-            </a:r>
-            <a:r>
-              <a:rPr lang="de-DE" dirty="0" err="1"/>
-              <a:t>database</a:t>
-            </a:r>
-            <a:endParaRPr lang="de-DE" dirty="0"/>
-          </a:p>
-          <a:p>
-            <a:r>
-              <a:rPr lang="de-DE" dirty="0"/>
-              <a:t>Import </a:t>
-            </a:r>
-            <a:r>
-              <a:rPr lang="de-DE" dirty="0" err="1"/>
-              <a:t>of</a:t>
-            </a:r>
-            <a:r>
-              <a:rPr lang="de-DE" dirty="0"/>
-              <a:t> </a:t>
-            </a:r>
-            <a:r>
-              <a:rPr lang="de-DE" dirty="0" err="1"/>
-              <a:t>stations</a:t>
-            </a:r>
-            <a:r>
-              <a:rPr lang="de-DE" dirty="0"/>
-              <a:t> and </a:t>
-            </a:r>
-            <a:r>
-              <a:rPr lang="de-DE" dirty="0" err="1"/>
-              <a:t>data</a:t>
-            </a:r>
-            <a:r>
-              <a:rPr lang="de-DE" dirty="0"/>
-              <a:t> </a:t>
-            </a:r>
-          </a:p>
-          <a:p>
-            <a:r>
-              <a:rPr lang="de-DE" dirty="0" err="1"/>
-              <a:t>Automated</a:t>
-            </a:r>
-            <a:r>
-              <a:rPr lang="de-DE" dirty="0"/>
-              <a:t> </a:t>
-            </a:r>
-            <a:r>
-              <a:rPr lang="de-DE" dirty="0" err="1"/>
-              <a:t>interpolation</a:t>
-            </a:r>
-            <a:r>
-              <a:rPr lang="de-DE" dirty="0"/>
-              <a:t> </a:t>
-            </a:r>
-            <a:r>
-              <a:rPr lang="de-DE" dirty="0" err="1"/>
-              <a:t>of</a:t>
-            </a:r>
-            <a:r>
-              <a:rPr lang="de-DE" dirty="0"/>
-              <a:t> </a:t>
-            </a:r>
-            <a:r>
-              <a:rPr lang="de-DE" dirty="0" err="1"/>
-              <a:t>air</a:t>
-            </a:r>
-            <a:r>
-              <a:rPr lang="de-DE" dirty="0"/>
-              <a:t> </a:t>
-            </a:r>
-            <a:r>
-              <a:rPr lang="de-DE" dirty="0" err="1"/>
-              <a:t>quality</a:t>
-            </a:r>
-            <a:r>
-              <a:rPr lang="de-DE" dirty="0"/>
-              <a:t> </a:t>
-            </a:r>
-            <a:r>
-              <a:rPr lang="de-DE" dirty="0" err="1"/>
-              <a:t>data</a:t>
-            </a:r>
-            <a:r>
-              <a:rPr lang="de-DE" dirty="0"/>
-              <a:t> </a:t>
-            </a:r>
-            <a:r>
-              <a:rPr lang="de-DE" dirty="0" err="1"/>
-              <a:t>to</a:t>
-            </a:r>
-            <a:r>
-              <a:rPr lang="de-DE" dirty="0"/>
-              <a:t> </a:t>
-            </a:r>
-            <a:r>
-              <a:rPr lang="de-DE" dirty="0" err="1"/>
-              <a:t>raster</a:t>
-            </a:r>
-            <a:endParaRPr lang="de-DE" dirty="0"/>
-          </a:p>
-          <a:p>
-            <a:endParaRPr lang="de-DE" dirty="0"/>
+            <a:endParaRPr lang="en-US"/>
           </a:p>
         </p:txBody>
       </p:sp>
@@ -12801,7 +12554,7 @@
           <p:cNvPr id="4" name="Fußzeilenplatzhalter 3">
             <a:extLst>
               <a:ext uri="{FF2B5EF4-FFF2-40B4-BE49-F238E27FC236}">
-                <a16:creationId xmlns:a16="http://schemas.microsoft.com/office/drawing/2014/main" id="{9BB50DBA-F8CA-488F-AF17-7E1223C542B5}"/>
+                <a16:creationId xmlns:a16="http://schemas.microsoft.com/office/drawing/2014/main" id="{254A27FC-30E1-46D0-987E-BFB00E1C1185}"/>
               </a:ext>
             </a:extLst>
           </p:cNvPr>
@@ -12812,55 +12565,22 @@
             <p:ph type="ftr" sz="quarter" idx="11"/>
           </p:nvPr>
         </p:nvSpPr>
-        <p:spPr>
-          <a:xfrm>
-            <a:off x="1557453" y="6459784"/>
-            <a:ext cx="9077094" cy="365125"/>
-          </a:xfrm>
-        </p:spPr>
+        <p:spPr/>
         <p:txBody>
           <a:bodyPr/>
           <a:lstStyle/>
           <a:p>
             <a:pPr algn="l"/>
             <a:r>
-              <a:rPr lang="en-US" dirty="0"/>
-              <a:t>Seminar: GIS Analyses with FOSSGIS    					 Speakers: </a:t>
-            </a:r>
-            <a:r>
-              <a:rPr lang="en-US" dirty="0" err="1"/>
-              <a:t>Amandus</a:t>
-            </a:r>
-            <a:r>
-              <a:rPr lang="en-US" dirty="0"/>
-              <a:t> </a:t>
-            </a:r>
-            <a:r>
-              <a:rPr lang="en-US" dirty="0" err="1"/>
-              <a:t>Butzer</a:t>
-            </a:r>
-            <a:r>
-              <a:rPr lang="en-US" dirty="0"/>
-              <a:t>, Julian </a:t>
-            </a:r>
-            <a:r>
-              <a:rPr lang="en-US" dirty="0" err="1"/>
-              <a:t>Käflein</a:t>
+              <a:rPr lang="en-US"/>
+              <a:t>Seminar: GIS Analyses with FOSSGIS    					 Speakers: Amandus Butzer, Julian Käflein</a:t>
             </a:r>
             <a:br>
               <a:rPr lang="en-US"/>
             </a:br>
             <a:r>
               <a:rPr lang="en-US"/>
-              <a:t>Teacher: </a:t>
-            </a:r>
-            <a:r>
-              <a:rPr lang="en-US" dirty="0"/>
-              <a:t>Christina Ludwig							 </a:t>
-            </a:r>
-            <a:r>
-              <a:rPr lang="en-US"/>
-              <a:t>	29.01.2019</a:t>
+              <a:t>Teacher: Christina Ludwig							 			29.01.2019</a:t>
             </a:r>
             <a:endParaRPr lang="en-DE" dirty="0"/>
           </a:p>
@@ -12871,7 +12591,7 @@
           <p:cNvPr id="5" name="Foliennummernplatzhalter 4">
             <a:extLst>
               <a:ext uri="{FF2B5EF4-FFF2-40B4-BE49-F238E27FC236}">
-                <a16:creationId xmlns:a16="http://schemas.microsoft.com/office/drawing/2014/main" id="{497CCE22-4AC4-413E-9838-46C364316E93}"/>
+                <a16:creationId xmlns:a16="http://schemas.microsoft.com/office/drawing/2014/main" id="{72A39DE9-715C-4734-9F05-956FB4CAFE3A}"/>
               </a:ext>
             </a:extLst>
           </p:cNvPr>
@@ -12898,7 +12618,7 @@
     </p:spTree>
     <p:extLst>
       <p:ext uri="{BB962C8B-B14F-4D97-AF65-F5344CB8AC3E}">
-        <p14:creationId xmlns:p14="http://schemas.microsoft.com/office/powerpoint/2010/main" val="3706620885"/>
+        <p14:creationId xmlns:p14="http://schemas.microsoft.com/office/powerpoint/2010/main" val="1253912680"/>
       </p:ext>
     </p:extLst>
   </p:cSld>
@@ -12930,7 +12650,7 @@
           <p:cNvPr id="2" name="Titel 1">
             <a:extLst>
               <a:ext uri="{FF2B5EF4-FFF2-40B4-BE49-F238E27FC236}">
-                <a16:creationId xmlns:a16="http://schemas.microsoft.com/office/drawing/2014/main" id="{FCE69CA9-E8D2-4F79-BFAD-54039ABCBDDF}"/>
+                <a16:creationId xmlns:a16="http://schemas.microsoft.com/office/drawing/2014/main" id="{920B986F-74B7-4C35-A29D-53A7D8985E8C}"/>
               </a:ext>
             </a:extLst>
           </p:cNvPr>
@@ -12947,8 +12667,12 @@
           <a:lstStyle/>
           <a:p>
             <a:r>
+              <a:rPr lang="de-DE" dirty="0"/>
+              <a:t>Milestones so </a:t>
+            </a:r>
+            <a:r>
               <a:rPr lang="de-DE" dirty="0" err="1"/>
-              <a:t>Results</a:t>
+              <a:t>far</a:t>
             </a:r>
             <a:endParaRPr lang="en-DE" dirty="0"/>
           </a:p>
@@ -12959,7 +12683,7 @@
           <p:cNvPr id="3" name="Inhaltsplatzhalter 2">
             <a:extLst>
               <a:ext uri="{FF2B5EF4-FFF2-40B4-BE49-F238E27FC236}">
-                <a16:creationId xmlns:a16="http://schemas.microsoft.com/office/drawing/2014/main" id="{5F114F6C-700E-4B2E-9E13-4E2F4DA2AE20}"/>
+                <a16:creationId xmlns:a16="http://schemas.microsoft.com/office/drawing/2014/main" id="{5714CDD2-0588-42E0-93C1-65CA540CA6AD}"/>
               </a:ext>
             </a:extLst>
           </p:cNvPr>
@@ -12976,31 +12700,16 @@
           <a:lstStyle/>
           <a:p>
             <a:r>
-              <a:rPr lang="de-DE" dirty="0"/>
-              <a:t>Luftdaten.info </a:t>
-            </a:r>
-            <a:r>
               <a:rPr lang="de-DE" dirty="0" err="1"/>
-              <a:t>sensors</a:t>
+              <a:t>Automated</a:t>
             </a:r>
             <a:r>
               <a:rPr lang="de-DE" dirty="0"/>
               <a:t> </a:t>
             </a:r>
-          </a:p>
-          <a:p>
-            <a:pPr lvl="1"/>
             <a:r>
               <a:rPr lang="de-DE" dirty="0" err="1"/>
-              <a:t>Relatively</a:t>
-            </a:r>
-            <a:r>
-              <a:rPr lang="de-DE" dirty="0"/>
-              <a:t> large, non-</a:t>
-            </a:r>
-            <a:r>
-              <a:rPr lang="de-DE" dirty="0" err="1"/>
-              <a:t>systematic</a:t>
+              <a:t>download</a:t>
             </a:r>
             <a:r>
               <a:rPr lang="de-DE" dirty="0"/>
@@ -13008,7 +12717,7 @@
             </a:r>
             <a:r>
               <a:rPr lang="de-DE" dirty="0" err="1"/>
-              <a:t>discrepancy</a:t>
+              <a:t>of</a:t>
             </a:r>
             <a:r>
               <a:rPr lang="de-DE" dirty="0"/>
@@ -13016,55 +12725,14 @@
             </a:r>
             <a:r>
               <a:rPr lang="de-DE" dirty="0" err="1"/>
-              <a:t>between</a:t>
-            </a:r>
-            <a:r>
-              <a:rPr lang="de-DE" dirty="0"/>
-              <a:t> Luftdaten and LUBW </a:t>
-            </a:r>
+              <a:t>data</a:t>
+            </a:r>
+            <a:endParaRPr lang="de-DE" dirty="0"/>
+          </a:p>
+          <a:p>
             <a:r>
               <a:rPr lang="de-DE" dirty="0" err="1"/>
-              <a:t>sensors</a:t>
-            </a:r>
-            <a:r>
-              <a:rPr lang="de-DE" dirty="0"/>
-              <a:t> (cf. </a:t>
-            </a:r>
-            <a:r>
-              <a:rPr lang="de-DE" cap="small" dirty="0"/>
-              <a:t>LUBW 2017)</a:t>
-            </a:r>
-          </a:p>
-          <a:p>
-            <a:pPr marL="201168" lvl="1" indent="0">
-              <a:buNone/>
-            </a:pPr>
-            <a:r>
-              <a:rPr lang="de-DE" cap="small" dirty="0"/>
-              <a:t>BUT</a:t>
-            </a:r>
-          </a:p>
-          <a:p>
-            <a:pPr lvl="1"/>
-            <a:r>
-              <a:rPr lang="de-DE" dirty="0"/>
-              <a:t>Luftdaten network </a:t>
-            </a:r>
-            <a:r>
-              <a:rPr lang="de-DE" i="1" dirty="0" err="1"/>
-              <a:t>can</a:t>
-            </a:r>
-            <a:r>
-              <a:rPr lang="de-DE" i="1" dirty="0"/>
-              <a:t> </a:t>
-            </a:r>
-            <a:r>
-              <a:rPr lang="de-DE" dirty="0"/>
-              <a:t>sense </a:t>
-            </a:r>
-            <a:r>
-              <a:rPr lang="de-DE" dirty="0" err="1"/>
-              <a:t>general</a:t>
+              <a:t>Automated</a:t>
             </a:r>
             <a:r>
               <a:rPr lang="de-DE" dirty="0"/>
@@ -13072,33 +12740,210 @@
             </a:r>
             <a:r>
               <a:rPr lang="de-DE" dirty="0" err="1"/>
-              <a:t>particulate</a:t>
+              <a:t>ingestion</a:t>
             </a:r>
             <a:r>
               <a:rPr lang="de-DE" dirty="0"/>
-              <a:t> matter </a:t>
-            </a:r>
-            <a:r>
-              <a:rPr lang="de-DE" i="1" dirty="0" err="1"/>
-              <a:t>trend</a:t>
-            </a:r>
-            <a:r>
-              <a:rPr lang="de-DE" i="1" dirty="0"/>
               <a:t> </a:t>
             </a:r>
             <a:r>
+              <a:rPr lang="de-DE" dirty="0" err="1"/>
+              <a:t>of</a:t>
+            </a:r>
+            <a:r>
               <a:rPr lang="de-DE" dirty="0"/>
-              <a:t>in Stuttgart</a:t>
-            </a:r>
-          </a:p>
-          <a:p>
-            <a:pPr lvl="1"/>
+              <a:t> </a:t>
+            </a:r>
+            <a:r>
+              <a:rPr lang="de-DE" dirty="0" err="1"/>
+              <a:t>data</a:t>
+            </a:r>
+            <a:r>
+              <a:rPr lang="de-DE" dirty="0"/>
+              <a:t> </a:t>
+            </a:r>
+            <a:r>
+              <a:rPr lang="de-DE" dirty="0" err="1"/>
+              <a:t>into</a:t>
+            </a:r>
+            <a:r>
+              <a:rPr lang="de-DE" dirty="0"/>
+              <a:t> </a:t>
+            </a:r>
+            <a:r>
+              <a:rPr lang="de-DE" dirty="0" err="1"/>
+              <a:t>database</a:t>
+            </a:r>
             <a:endParaRPr lang="de-DE" dirty="0"/>
           </a:p>
           <a:p>
-            <a:pPr marL="201168" lvl="1" indent="0">
-              <a:buNone/>
-            </a:pPr>
+            <a:r>
+              <a:rPr lang="de-DE" dirty="0" err="1"/>
+              <a:t>Automated</a:t>
+            </a:r>
+            <a:r>
+              <a:rPr lang="de-DE" dirty="0"/>
+              <a:t> </a:t>
+            </a:r>
+            <a:r>
+              <a:rPr lang="de-DE" dirty="0" err="1"/>
+              <a:t>parsing</a:t>
+            </a:r>
+            <a:r>
+              <a:rPr lang="de-DE" dirty="0"/>
+              <a:t> and </a:t>
+            </a:r>
+            <a:r>
+              <a:rPr lang="de-DE" dirty="0" err="1"/>
+              <a:t>filtering</a:t>
+            </a:r>
+            <a:r>
+              <a:rPr lang="de-DE" dirty="0"/>
+              <a:t> </a:t>
+            </a:r>
+            <a:r>
+              <a:rPr lang="de-DE" dirty="0" err="1"/>
+              <a:t>of</a:t>
+            </a:r>
+            <a:r>
+              <a:rPr lang="de-DE" dirty="0"/>
+              <a:t> extreme </a:t>
+            </a:r>
+            <a:r>
+              <a:rPr lang="de-DE" dirty="0" err="1"/>
+              <a:t>values</a:t>
+            </a:r>
+            <a:endParaRPr lang="de-DE" dirty="0"/>
+          </a:p>
+          <a:p>
+            <a:r>
+              <a:rPr lang="de-DE" dirty="0"/>
+              <a:t>Connection </a:t>
+            </a:r>
+            <a:r>
+              <a:rPr lang="de-DE" dirty="0" err="1"/>
+              <a:t>of</a:t>
+            </a:r>
+            <a:r>
+              <a:rPr lang="de-DE" dirty="0"/>
+              <a:t> GRASS GIS </a:t>
+            </a:r>
+            <a:r>
+              <a:rPr lang="de-DE" dirty="0" err="1"/>
+              <a:t>modules</a:t>
+            </a:r>
+            <a:r>
+              <a:rPr lang="de-DE" dirty="0"/>
+              <a:t> </a:t>
+            </a:r>
+            <a:r>
+              <a:rPr lang="de-DE" dirty="0" err="1"/>
+              <a:t>to</a:t>
+            </a:r>
+            <a:r>
+              <a:rPr lang="de-DE" dirty="0"/>
+              <a:t> </a:t>
+            </a:r>
+            <a:r>
+              <a:rPr lang="de-DE" dirty="0" err="1"/>
+              <a:t>database</a:t>
+            </a:r>
+            <a:endParaRPr lang="de-DE" dirty="0"/>
+          </a:p>
+          <a:p>
+            <a:r>
+              <a:rPr lang="de-DE" dirty="0"/>
+              <a:t>Import </a:t>
+            </a:r>
+            <a:r>
+              <a:rPr lang="de-DE" dirty="0" err="1"/>
+              <a:t>of</a:t>
+            </a:r>
+            <a:r>
+              <a:rPr lang="de-DE" dirty="0"/>
+              <a:t> </a:t>
+            </a:r>
+            <a:r>
+              <a:rPr lang="de-DE" dirty="0" err="1"/>
+              <a:t>stations</a:t>
+            </a:r>
+            <a:r>
+              <a:rPr lang="de-DE" dirty="0"/>
+              <a:t> and </a:t>
+            </a:r>
+            <a:r>
+              <a:rPr lang="de-DE" dirty="0" err="1"/>
+              <a:t>data</a:t>
+            </a:r>
+            <a:r>
+              <a:rPr lang="de-DE" dirty="0"/>
+              <a:t> </a:t>
+            </a:r>
+          </a:p>
+          <a:p>
+            <a:r>
+              <a:rPr lang="de-DE" dirty="0" err="1"/>
+              <a:t>Automated</a:t>
+            </a:r>
+            <a:r>
+              <a:rPr lang="de-DE" dirty="0"/>
+              <a:t> </a:t>
+            </a:r>
+            <a:r>
+              <a:rPr lang="de-DE" dirty="0" err="1"/>
+              <a:t>interpolation</a:t>
+            </a:r>
+            <a:r>
+              <a:rPr lang="de-DE" dirty="0"/>
+              <a:t> </a:t>
+            </a:r>
+            <a:r>
+              <a:rPr lang="de-DE" dirty="0" err="1"/>
+              <a:t>of</a:t>
+            </a:r>
+            <a:r>
+              <a:rPr lang="de-DE" dirty="0"/>
+              <a:t> </a:t>
+            </a:r>
+            <a:r>
+              <a:rPr lang="de-DE" dirty="0" err="1"/>
+              <a:t>air</a:t>
+            </a:r>
+            <a:r>
+              <a:rPr lang="de-DE" dirty="0"/>
+              <a:t> </a:t>
+            </a:r>
+            <a:r>
+              <a:rPr lang="de-DE" dirty="0" err="1"/>
+              <a:t>quality</a:t>
+            </a:r>
+            <a:r>
+              <a:rPr lang="de-DE" dirty="0"/>
+              <a:t> </a:t>
+            </a:r>
+            <a:r>
+              <a:rPr lang="de-DE" dirty="0" err="1"/>
+              <a:t>data</a:t>
+            </a:r>
+            <a:r>
+              <a:rPr lang="de-DE" dirty="0"/>
+              <a:t> </a:t>
+            </a:r>
+            <a:r>
+              <a:rPr lang="de-DE" dirty="0" err="1"/>
+              <a:t>to</a:t>
+            </a:r>
+            <a:r>
+              <a:rPr lang="de-DE" dirty="0"/>
+              <a:t> </a:t>
+            </a:r>
+            <a:r>
+              <a:rPr lang="de-DE" dirty="0" err="1"/>
+              <a:t>raster</a:t>
+            </a:r>
+            <a:endParaRPr lang="de-DE" dirty="0"/>
+          </a:p>
+          <a:p>
             <a:endParaRPr lang="de-DE" dirty="0"/>
           </a:p>
         </p:txBody>
@@ -13108,7 +12953,7 @@
           <p:cNvPr id="4" name="Fußzeilenplatzhalter 3">
             <a:extLst>
               <a:ext uri="{FF2B5EF4-FFF2-40B4-BE49-F238E27FC236}">
-                <a16:creationId xmlns:a16="http://schemas.microsoft.com/office/drawing/2014/main" id="{D7150B2C-B570-46C0-8C4E-D20C654E0C0E}"/>
+                <a16:creationId xmlns:a16="http://schemas.microsoft.com/office/drawing/2014/main" id="{9BB50DBA-F8CA-488F-AF17-7E1223C542B5}"/>
               </a:ext>
             </a:extLst>
           </p:cNvPr>
@@ -13119,7 +12964,12 @@
             <p:ph type="ftr" sz="quarter" idx="11"/>
           </p:nvPr>
         </p:nvSpPr>
-        <p:spPr/>
+        <p:spPr>
+          <a:xfrm>
+            <a:off x="1557453" y="6459784"/>
+            <a:ext cx="9077094" cy="365125"/>
+          </a:xfrm>
+        </p:spPr>
         <p:txBody>
           <a:bodyPr/>
           <a:lstStyle/>
@@ -13158,7 +13008,7 @@
             </a:r>
             <a:r>
               <a:rPr lang="en-US" dirty="0"/>
-              <a:t>Christina Ludwig							 		</a:t>
+              <a:t>Christina Ludwig							 </a:t>
             </a:r>
             <a:r>
               <a:rPr lang="en-US"/>
@@ -13173,7 +13023,7 @@
           <p:cNvPr id="5" name="Foliennummernplatzhalter 4">
             <a:extLst>
               <a:ext uri="{FF2B5EF4-FFF2-40B4-BE49-F238E27FC236}">
-                <a16:creationId xmlns:a16="http://schemas.microsoft.com/office/drawing/2014/main" id="{69E9B261-5365-4E14-A54F-F4C805081E02}"/>
+                <a16:creationId xmlns:a16="http://schemas.microsoft.com/office/drawing/2014/main" id="{497CCE22-4AC4-413E-9838-46C364316E93}"/>
               </a:ext>
             </a:extLst>
           </p:cNvPr>
@@ -13200,7 +13050,7 @@
     </p:spTree>
     <p:extLst>
       <p:ext uri="{BB962C8B-B14F-4D97-AF65-F5344CB8AC3E}">
-        <p14:creationId xmlns:p14="http://schemas.microsoft.com/office/powerpoint/2010/main" val="3494549291"/>
+        <p14:creationId xmlns:p14="http://schemas.microsoft.com/office/powerpoint/2010/main" val="3706620885"/>
       </p:ext>
     </p:extLst>
   </p:cSld>
@@ -13232,7 +13082,7 @@
           <p:cNvPr id="2" name="Titel 1">
             <a:extLst>
               <a:ext uri="{FF2B5EF4-FFF2-40B4-BE49-F238E27FC236}">
-                <a16:creationId xmlns:a16="http://schemas.microsoft.com/office/drawing/2014/main" id="{BBED0D7E-1276-41F4-AE7D-1CF16C61D46B}"/>
+                <a16:creationId xmlns:a16="http://schemas.microsoft.com/office/drawing/2014/main" id="{FCE69CA9-E8D2-4F79-BFAD-54039ABCBDDF}"/>
               </a:ext>
             </a:extLst>
           </p:cNvPr>
@@ -13250,31 +13100,7 @@
           <a:p>
             <a:r>
               <a:rPr lang="de-DE" dirty="0" err="1"/>
-              <a:t>Limitations</a:t>
-            </a:r>
-            <a:r>
-              <a:rPr lang="de-DE" dirty="0"/>
-              <a:t> </a:t>
-            </a:r>
-            <a:r>
-              <a:rPr lang="de-DE" dirty="0" err="1"/>
-              <a:t>of</a:t>
-            </a:r>
-            <a:r>
-              <a:rPr lang="de-DE" dirty="0"/>
-              <a:t> </a:t>
-            </a:r>
-            <a:r>
-              <a:rPr lang="de-DE" dirty="0" err="1"/>
-              <a:t>the</a:t>
-            </a:r>
-            <a:r>
-              <a:rPr lang="de-DE" dirty="0"/>
-              <a:t> </a:t>
-            </a:r>
-            <a:r>
-              <a:rPr lang="de-DE" dirty="0" err="1"/>
-              <a:t>analysis</a:t>
+              <a:t>Results</a:t>
             </a:r>
             <a:endParaRPr lang="en-DE" dirty="0"/>
           </a:p>
@@ -13285,7 +13111,7 @@
           <p:cNvPr id="3" name="Inhaltsplatzhalter 2">
             <a:extLst>
               <a:ext uri="{FF2B5EF4-FFF2-40B4-BE49-F238E27FC236}">
-                <a16:creationId xmlns:a16="http://schemas.microsoft.com/office/drawing/2014/main" id="{9993E090-E389-4754-AFF2-DE8CC3221A54}"/>
+                <a16:creationId xmlns:a16="http://schemas.microsoft.com/office/drawing/2014/main" id="{5F114F6C-700E-4B2E-9E13-4E2F4DA2AE20}"/>
               </a:ext>
             </a:extLst>
           </p:cNvPr>
@@ -13298,42 +13124,99 @@
         </p:nvSpPr>
         <p:spPr/>
         <p:txBody>
-          <a:bodyPr>
-            <a:normAutofit lnSpcReduction="10000"/>
-          </a:bodyPr>
+          <a:bodyPr/>
           <a:lstStyle/>
           <a:p>
             <a:r>
+              <a:rPr lang="de-DE" dirty="0"/>
+              <a:t>Luftdaten.info </a:t>
+            </a:r>
+            <a:r>
               <a:rPr lang="de-DE" dirty="0" err="1"/>
-              <a:t>Accuracy</a:t>
+              <a:t>sensors</a:t>
             </a:r>
             <a:r>
               <a:rPr lang="de-DE" dirty="0"/>
               <a:t> </a:t>
             </a:r>
+          </a:p>
+          <a:p>
+            <a:pPr lvl="1"/>
             <a:r>
               <a:rPr lang="de-DE" dirty="0" err="1"/>
-              <a:t>of</a:t>
+              <a:t>Relatively</a:t>
             </a:r>
             <a:r>
               <a:rPr lang="de-DE" dirty="0"/>
-              <a:t> Luftdaten </a:t>
+              <a:t> large, non-</a:t>
+            </a:r>
+            <a:r>
+              <a:rPr lang="de-DE" dirty="0" err="1"/>
+              <a:t>systematic</a:t>
+            </a:r>
+            <a:r>
+              <a:rPr lang="de-DE" dirty="0"/>
+              <a:t> </a:t>
+            </a:r>
+            <a:r>
+              <a:rPr lang="de-DE" dirty="0" err="1"/>
+              <a:t>discrepancy</a:t>
+            </a:r>
+            <a:r>
+              <a:rPr lang="de-DE" dirty="0"/>
+              <a:t> </a:t>
+            </a:r>
+            <a:r>
+              <a:rPr lang="de-DE" dirty="0" err="1"/>
+              <a:t>between</a:t>
+            </a:r>
+            <a:r>
+              <a:rPr lang="de-DE" dirty="0"/>
+              <a:t> Luftdaten and LUBW </a:t>
             </a:r>
             <a:r>
               <a:rPr lang="de-DE" dirty="0" err="1"/>
               <a:t>sensors</a:t>
             </a:r>
-            <a:endParaRPr lang="de-DE" dirty="0"/>
+            <a:r>
+              <a:rPr lang="de-DE" dirty="0"/>
+              <a:t> (cf. </a:t>
+            </a:r>
+            <a:r>
+              <a:rPr lang="de-DE" cap="small" dirty="0"/>
+              <a:t>LUBW 2017)</a:t>
+            </a:r>
+          </a:p>
+          <a:p>
+            <a:pPr marL="201168" lvl="1" indent="0">
+              <a:buNone/>
+            </a:pPr>
+            <a:r>
+              <a:rPr lang="de-DE" cap="small" dirty="0"/>
+              <a:t>BUT</a:t>
+            </a:r>
           </a:p>
           <a:p>
             <a:pPr lvl="1"/>
             <a:r>
               <a:rPr lang="de-DE" dirty="0"/>
-              <a:t>Need </a:t>
+              <a:t>Luftdaten network </a:t>
+            </a:r>
+            <a:r>
+              <a:rPr lang="de-DE" i="1" dirty="0" err="1"/>
+              <a:t>can</a:t>
+            </a:r>
+            <a:r>
+              <a:rPr lang="de-DE" i="1" dirty="0"/>
+              <a:t> </a:t>
+            </a:r>
+            <a:r>
+              <a:rPr lang="de-DE" dirty="0"/>
+              <a:t>sense </a:t>
             </a:r>
             <a:r>
               <a:rPr lang="de-DE" dirty="0" err="1"/>
-              <a:t>to</a:t>
+              <a:t>general</a:t>
             </a:r>
             <a:r>
               <a:rPr lang="de-DE" dirty="0"/>
@@ -13341,63 +13224,27 @@
             </a:r>
             <a:r>
               <a:rPr lang="de-DE" dirty="0" err="1"/>
-              <a:t>filter</a:t>
+              <a:t>particulate</a:t>
             </a:r>
             <a:r>
               <a:rPr lang="de-DE" dirty="0"/>
-              <a:t> extreme </a:t>
-            </a:r>
-            <a:r>
-              <a:rPr lang="de-DE" dirty="0" err="1"/>
-              <a:t>values</a:t>
+              <a:t> matter </a:t>
+            </a:r>
+            <a:r>
+              <a:rPr lang="de-DE" i="1" dirty="0" err="1"/>
+              <a:t>trend</a:t>
+            </a:r>
+            <a:r>
+              <a:rPr lang="de-DE" i="1" dirty="0"/>
+              <a:t> </a:t>
             </a:r>
             <a:r>
               <a:rPr lang="de-DE" dirty="0"/>
-              <a:t> (</a:t>
-            </a:r>
-            <a:r>
-              <a:rPr lang="de-DE" dirty="0" err="1"/>
-              <a:t>both</a:t>
-            </a:r>
-            <a:r>
-              <a:rPr lang="de-DE" dirty="0"/>
-              <a:t> absolute and relative) </a:t>
+              <a:t>in Stuttgart</a:t>
             </a:r>
           </a:p>
           <a:p>
             <a:pPr lvl="1"/>
-            <a:r>
-              <a:rPr lang="de-DE" dirty="0"/>
-              <a:t>Constant </a:t>
-            </a:r>
-            <a:r>
-              <a:rPr lang="de-DE" dirty="0" err="1"/>
-              <a:t>discrepancy</a:t>
-            </a:r>
-            <a:r>
-              <a:rPr lang="de-DE" dirty="0"/>
-              <a:t> </a:t>
-            </a:r>
-            <a:r>
-              <a:rPr lang="de-DE" dirty="0" err="1"/>
-              <a:t>to</a:t>
-            </a:r>
-            <a:r>
-              <a:rPr lang="de-DE" dirty="0"/>
-              <a:t> </a:t>
-            </a:r>
-            <a:r>
-              <a:rPr lang="de-DE" dirty="0" err="1"/>
-              <a:t>official</a:t>
-            </a:r>
-            <a:r>
-              <a:rPr lang="de-DE" dirty="0"/>
-              <a:t> </a:t>
-            </a:r>
-            <a:r>
-              <a:rPr lang="de-DE" dirty="0" err="1"/>
-              <a:t>measurements</a:t>
-            </a:r>
             <a:endParaRPr lang="de-DE" dirty="0"/>
           </a:p>
           <a:p>
@@ -13406,291 +13253,70 @@
             </a:pPr>
             <a:endParaRPr lang="de-DE" dirty="0"/>
           </a:p>
-          <a:p>
-            <a:r>
-              <a:rPr lang="de-DE" dirty="0"/>
-              <a:t>Interpolation </a:t>
-            </a:r>
-            <a:r>
-              <a:rPr lang="de-DE" dirty="0" err="1"/>
-              <a:t>parameters</a:t>
-            </a:r>
-            <a:r>
-              <a:rPr lang="de-DE" dirty="0"/>
+        </p:txBody>
+      </p:sp>
+      <p:sp>
+        <p:nvSpPr>
+          <p:cNvPr id="4" name="Fußzeilenplatzhalter 3">
+            <a:extLst>
+              <a:ext uri="{FF2B5EF4-FFF2-40B4-BE49-F238E27FC236}">
+                <a16:creationId xmlns:a16="http://schemas.microsoft.com/office/drawing/2014/main" id="{D7150B2C-B570-46C0-8C4E-D20C654E0C0E}"/>
+              </a:ext>
+            </a:extLst>
+          </p:cNvPr>
+          <p:cNvSpPr>
+            <a:spLocks noGrp="1"/>
+          </p:cNvSpPr>
+          <p:nvPr>
+            <p:ph type="ftr" sz="quarter" idx="11"/>
+          </p:nvPr>
+        </p:nvSpPr>
+        <p:spPr/>
+        <p:txBody>
+          <a:bodyPr/>
+          <a:lstStyle/>
+          <a:p>
+            <a:pPr algn="l"/>
+            <a:r>
+              <a:rPr lang="en-US" dirty="0"/>
+              <a:t>Seminar: GIS Analyses with FOSSGIS    					 Speakers: </a:t>
+            </a:r>
+            <a:r>
+              <a:rPr lang="en-US" dirty="0" err="1"/>
+              <a:t>Amandus</a:t>
+            </a:r>
+            <a:r>
+              <a:rPr lang="en-US" dirty="0"/>
               <a:t> </a:t>
             </a:r>
             <a:r>
-              <a:rPr lang="de-DE" dirty="0" err="1"/>
-              <a:t>are</a:t>
-            </a:r>
-            <a:r>
-              <a:rPr lang="de-DE" dirty="0"/>
-              <a:t> „</a:t>
-            </a:r>
-            <a:r>
-              <a:rPr lang="de-DE" dirty="0" err="1"/>
-              <a:t>best</a:t>
-            </a:r>
-            <a:r>
-              <a:rPr lang="de-DE" dirty="0"/>
-              <a:t> fit“</a:t>
-            </a:r>
-          </a:p>
-          <a:p>
-            <a:pPr lvl="1"/>
-            <a:r>
-              <a:rPr lang="de-DE" dirty="0" err="1"/>
-              <a:t>No</a:t>
-            </a:r>
-            <a:r>
-              <a:rPr lang="de-DE" dirty="0"/>
-              <a:t> ‚</a:t>
-            </a:r>
-            <a:r>
-              <a:rPr lang="de-DE" dirty="0" err="1"/>
-              <a:t>correct</a:t>
-            </a:r>
-            <a:r>
-              <a:rPr lang="de-DE" dirty="0"/>
-              <a:t>‘ </a:t>
-            </a:r>
-            <a:r>
-              <a:rPr lang="de-DE" dirty="0" err="1"/>
-              <a:t>solution</a:t>
-            </a:r>
-            <a:r>
-              <a:rPr lang="de-DE" dirty="0"/>
-              <a:t> </a:t>
-            </a:r>
-            <a:r>
-              <a:rPr lang="de-DE" dirty="0" err="1"/>
-              <a:t>to</a:t>
-            </a:r>
-            <a:r>
-              <a:rPr lang="de-DE" dirty="0"/>
-              <a:t> </a:t>
-            </a:r>
-            <a:r>
-              <a:rPr lang="de-DE" dirty="0" err="1"/>
-              <a:t>model</a:t>
-            </a:r>
-            <a:r>
-              <a:rPr lang="de-DE" dirty="0"/>
-              <a:t> </a:t>
-            </a:r>
-            <a:r>
-              <a:rPr lang="de-DE" dirty="0" err="1"/>
-              <a:t>pollution</a:t>
-            </a:r>
-            <a:r>
-              <a:rPr lang="de-DE" dirty="0"/>
-              <a:t> </a:t>
-            </a:r>
-            <a:r>
-              <a:rPr lang="de-DE" dirty="0" err="1"/>
-              <a:t>rasters</a:t>
-            </a:r>
-            <a:r>
-              <a:rPr lang="de-DE" dirty="0"/>
-              <a:t> </a:t>
-            </a:r>
-            <a:r>
-              <a:rPr lang="de-DE" dirty="0" err="1"/>
-              <a:t>from</a:t>
-            </a:r>
-            <a:r>
-              <a:rPr lang="de-DE" dirty="0"/>
-              <a:t> </a:t>
-            </a:r>
-            <a:r>
-              <a:rPr lang="de-DE" dirty="0" err="1"/>
-              <a:t>sensors</a:t>
-            </a:r>
-            <a:endParaRPr lang="de-DE" dirty="0"/>
-          </a:p>
-          <a:p>
-            <a:pPr marL="201168" lvl="1" indent="0">
-              <a:buNone/>
-            </a:pPr>
-            <a:endParaRPr lang="de-DE" dirty="0"/>
-          </a:p>
-          <a:p>
-            <a:r>
-              <a:rPr lang="de-DE" dirty="0"/>
-              <a:t>Small </a:t>
-            </a:r>
-            <a:r>
-              <a:rPr lang="de-DE" dirty="0" err="1"/>
-              <a:t>scale</a:t>
-            </a:r>
-            <a:r>
-              <a:rPr lang="de-DE" dirty="0"/>
-              <a:t> </a:t>
-            </a:r>
-            <a:r>
-              <a:rPr lang="de-DE" dirty="0" err="1"/>
-              <a:t>of</a:t>
-            </a:r>
-            <a:r>
-              <a:rPr lang="de-DE" dirty="0"/>
-              <a:t> </a:t>
-            </a:r>
-            <a:r>
-              <a:rPr lang="de-DE" dirty="0" err="1"/>
-              <a:t>study</a:t>
-            </a:r>
-            <a:r>
-              <a:rPr lang="de-DE" dirty="0"/>
-              <a:t> </a:t>
-            </a:r>
-            <a:r>
-              <a:rPr lang="de-DE" dirty="0" err="1"/>
-              <a:t>area</a:t>
-            </a:r>
-            <a:endParaRPr lang="de-DE" dirty="0"/>
-          </a:p>
-          <a:p>
-            <a:pPr lvl="1"/>
-            <a:r>
-              <a:rPr lang="de-DE" dirty="0"/>
-              <a:t>Large </a:t>
-            </a:r>
-            <a:r>
-              <a:rPr lang="de-DE" dirty="0" err="1"/>
-              <a:t>effects</a:t>
-            </a:r>
-            <a:r>
-              <a:rPr lang="de-DE" dirty="0"/>
-              <a:t> </a:t>
-            </a:r>
-            <a:r>
-              <a:rPr lang="de-DE" dirty="0" err="1"/>
-              <a:t>of</a:t>
-            </a:r>
-            <a:r>
-              <a:rPr lang="de-DE" dirty="0"/>
-              <a:t> additional </a:t>
-            </a:r>
-            <a:r>
-              <a:rPr lang="de-DE" dirty="0" err="1"/>
-              <a:t>factors</a:t>
-            </a:r>
-            <a:r>
-              <a:rPr lang="de-DE" dirty="0"/>
-              <a:t>, </a:t>
-            </a:r>
-            <a:r>
-              <a:rPr lang="de-DE" dirty="0" err="1"/>
-              <a:t>i.e</a:t>
-            </a:r>
-            <a:r>
-              <a:rPr lang="de-DE" dirty="0"/>
-              <a:t> </a:t>
-            </a:r>
-            <a:r>
-              <a:rPr lang="de-DE" dirty="0" err="1"/>
-              <a:t>atmospheric</a:t>
-            </a:r>
-            <a:r>
-              <a:rPr lang="de-DE" dirty="0"/>
-              <a:t> </a:t>
-            </a:r>
-            <a:r>
-              <a:rPr lang="de-DE" dirty="0" err="1"/>
-              <a:t>conditions</a:t>
-            </a:r>
-            <a:r>
-              <a:rPr lang="de-DE" dirty="0"/>
-              <a:t> (wind / </a:t>
-            </a:r>
-            <a:r>
-              <a:rPr lang="de-DE" dirty="0" err="1"/>
-              <a:t>precipitation</a:t>
-            </a:r>
-            <a:r>
-              <a:rPr lang="de-DE" dirty="0"/>
-              <a:t>) / </a:t>
-            </a:r>
-          </a:p>
-          <a:p>
-            <a:pPr marL="201168" lvl="1" indent="0">
-              <a:buNone/>
-            </a:pPr>
-            <a:r>
-              <a:rPr lang="de-DE" dirty="0"/>
-              <a:t>    </a:t>
-            </a:r>
-            <a:r>
-              <a:rPr lang="de-DE" dirty="0" err="1"/>
-              <a:t>land</a:t>
-            </a:r>
-            <a:r>
-              <a:rPr lang="de-DE" dirty="0"/>
-              <a:t> </a:t>
-            </a:r>
-            <a:r>
-              <a:rPr lang="de-DE" dirty="0" err="1"/>
-              <a:t>cover</a:t>
-            </a:r>
-            <a:r>
-              <a:rPr lang="de-DE" dirty="0"/>
-              <a:t> (</a:t>
-            </a:r>
-            <a:r>
-              <a:rPr lang="de-DE" dirty="0" err="1"/>
-              <a:t>buildings</a:t>
-            </a:r>
-            <a:r>
-              <a:rPr lang="de-DE" dirty="0"/>
-              <a:t> / </a:t>
-            </a:r>
-            <a:r>
-              <a:rPr lang="de-DE" dirty="0" err="1"/>
-              <a:t>parks</a:t>
-            </a:r>
-            <a:r>
-              <a:rPr lang="de-DE" dirty="0"/>
-              <a:t>)</a:t>
-            </a:r>
-          </a:p>
-          <a:p>
-            <a:pPr marL="201168" lvl="1" indent="0">
-              <a:buNone/>
-            </a:pPr>
-            <a:endParaRPr lang="de-DE" dirty="0"/>
-          </a:p>
-          <a:p>
-            <a:pPr marL="201168" lvl="1" indent="0">
-              <a:buNone/>
-            </a:pPr>
-            <a:r>
-              <a:rPr lang="de-DE" dirty="0"/>
-              <a:t>Short </a:t>
-            </a:r>
-            <a:r>
-              <a:rPr lang="de-DE" dirty="0" err="1"/>
-              <a:t>amount</a:t>
-            </a:r>
-            <a:r>
-              <a:rPr lang="de-DE" dirty="0"/>
-              <a:t> </a:t>
-            </a:r>
-            <a:r>
-              <a:rPr lang="de-DE" dirty="0" err="1"/>
-              <a:t>of</a:t>
-            </a:r>
-            <a:r>
-              <a:rPr lang="de-DE" dirty="0"/>
-              <a:t> </a:t>
-            </a:r>
-            <a:r>
-              <a:rPr lang="de-DE" dirty="0" err="1"/>
-              <a:t>sensing</a:t>
-            </a:r>
-            <a:r>
-              <a:rPr lang="de-DE" dirty="0"/>
-              <a:t> time</a:t>
-            </a:r>
+              <a:rPr lang="en-US" dirty="0" err="1"/>
+              <a:t>Butzer</a:t>
+            </a:r>
+            <a:r>
+              <a:rPr lang="en-US" dirty="0"/>
+              <a:t>, Julian </a:t>
+            </a:r>
+            <a:r>
+              <a:rPr lang="en-US" dirty="0" err="1"/>
+              <a:t>Käflein</a:t>
+            </a:r>
+            <a:br>
+              <a:rPr lang="en-US"/>
+            </a:br>
+            <a:r>
+              <a:rPr lang="en-US"/>
+              <a:t>Teacher: </a:t>
+            </a:r>
+            <a:r>
+              <a:rPr lang="en-US" dirty="0"/>
+              <a:t>Christina Ludwig							 		</a:t>
+            </a:r>
+            <a:r>
+              <a:rPr lang="en-US"/>
+              <a:t>	29.01.2019</a:t>
+            </a:r>
+            <a:endParaRPr lang="en-DE" dirty="0"/>
           </a:p>
         </p:txBody>
       </p:sp>
@@ -13699,7 +13325,7 @@
           <p:cNvPr id="5" name="Foliennummernplatzhalter 4">
             <a:extLst>
               <a:ext uri="{FF2B5EF4-FFF2-40B4-BE49-F238E27FC236}">
-                <a16:creationId xmlns:a16="http://schemas.microsoft.com/office/drawing/2014/main" id="{68CA6FEB-BDF5-4146-9132-CE78568122FF}"/>
+                <a16:creationId xmlns:a16="http://schemas.microsoft.com/office/drawing/2014/main" id="{69E9B261-5365-4E14-A54F-F4C805081E02}"/>
               </a:ext>
             </a:extLst>
           </p:cNvPr>
@@ -13723,80 +13349,10 @@
           </a:p>
         </p:txBody>
       </p:sp>
-      <p:sp>
-        <p:nvSpPr>
-          <p:cNvPr id="6" name="Fußzeilenplatzhalter 3">
-            <a:extLst>
-              <a:ext uri="{FF2B5EF4-FFF2-40B4-BE49-F238E27FC236}">
-                <a16:creationId xmlns:a16="http://schemas.microsoft.com/office/drawing/2014/main" id="{B720173F-2071-4F06-97B1-6270805C9969}"/>
-              </a:ext>
-            </a:extLst>
-          </p:cNvPr>
-          <p:cNvSpPr>
-            <a:spLocks noGrp="1"/>
-          </p:cNvSpPr>
-          <p:nvPr>
-            <p:ph type="ftr" sz="quarter" idx="11"/>
-          </p:nvPr>
-        </p:nvSpPr>
-        <p:spPr>
-          <a:xfrm>
-            <a:off x="1557453" y="6459784"/>
-            <a:ext cx="9077094" cy="365125"/>
-          </a:xfrm>
-        </p:spPr>
-        <p:txBody>
-          <a:bodyPr/>
-          <a:lstStyle/>
-          <a:p>
-            <a:pPr algn="l"/>
-            <a:r>
-              <a:rPr lang="en-US" dirty="0"/>
-              <a:t>Seminar: GIS Analyses with FOSSGIS    					 Speakers: </a:t>
-            </a:r>
-            <a:r>
-              <a:rPr lang="en-US" dirty="0" err="1"/>
-              <a:t>Amandus</a:t>
-            </a:r>
-            <a:r>
-              <a:rPr lang="en-US" dirty="0"/>
-              <a:t> </a:t>
-            </a:r>
-            <a:r>
-              <a:rPr lang="en-US" dirty="0" err="1"/>
-              <a:t>Butzer</a:t>
-            </a:r>
-            <a:r>
-              <a:rPr lang="en-US" dirty="0"/>
-              <a:t>, Julian </a:t>
-            </a:r>
-            <a:r>
-              <a:rPr lang="en-US" dirty="0" err="1"/>
-              <a:t>Käflein</a:t>
-            </a:r>
-            <a:br>
-              <a:rPr lang="en-US"/>
-            </a:br>
-            <a:r>
-              <a:rPr lang="en-US"/>
-              <a:t>Teacher: </a:t>
-            </a:r>
-            <a:r>
-              <a:rPr lang="en-US" dirty="0"/>
-              <a:t>Christina Ludwig							 </a:t>
-            </a:r>
-            <a:r>
-              <a:rPr lang="en-US"/>
-              <a:t>	29.01.2019</a:t>
-            </a:r>
-            <a:endParaRPr lang="en-DE" dirty="0"/>
-          </a:p>
-        </p:txBody>
-      </p:sp>
     </p:spTree>
     <p:extLst>
       <p:ext uri="{BB962C8B-B14F-4D97-AF65-F5344CB8AC3E}">
-        <p14:creationId xmlns:p14="http://schemas.microsoft.com/office/powerpoint/2010/main" val="4103345620"/>
+        <p14:creationId xmlns:p14="http://schemas.microsoft.com/office/powerpoint/2010/main" val="3494549291"/>
       </p:ext>
     </p:extLst>
   </p:cSld>
@@ -13828,7 +13384,7 @@
           <p:cNvPr id="2" name="Titel 1">
             <a:extLst>
               <a:ext uri="{FF2B5EF4-FFF2-40B4-BE49-F238E27FC236}">
-                <a16:creationId xmlns:a16="http://schemas.microsoft.com/office/drawing/2014/main" id="{30282CB8-7EA7-4E07-8047-7F80335FA284}"/>
+                <a16:creationId xmlns:a16="http://schemas.microsoft.com/office/drawing/2014/main" id="{BBED0D7E-1276-41F4-AE7D-1CF16C61D46B}"/>
               </a:ext>
             </a:extLst>
           </p:cNvPr>
@@ -13845,8 +13401,32 @@
           <a:lstStyle/>
           <a:p>
             <a:r>
+              <a:rPr lang="de-DE" dirty="0" err="1"/>
+              <a:t>Limitations</a:t>
+            </a:r>
+            <a:r>
               <a:rPr lang="de-DE" dirty="0"/>
-              <a:t>Sources</a:t>
+              <a:t> </a:t>
+            </a:r>
+            <a:r>
+              <a:rPr lang="de-DE" dirty="0" err="1"/>
+              <a:t>of</a:t>
+            </a:r>
+            <a:r>
+              <a:rPr lang="de-DE" dirty="0"/>
+              <a:t> </a:t>
+            </a:r>
+            <a:r>
+              <a:rPr lang="de-DE" dirty="0" err="1"/>
+              <a:t>the</a:t>
+            </a:r>
+            <a:r>
+              <a:rPr lang="de-DE" dirty="0"/>
+              <a:t> </a:t>
+            </a:r>
+            <a:r>
+              <a:rPr lang="de-DE" dirty="0" err="1"/>
+              <a:t>analysis</a:t>
             </a:r>
             <a:endParaRPr lang="en-DE" dirty="0"/>
           </a:p>
@@ -13857,7 +13437,7 @@
           <p:cNvPr id="3" name="Inhaltsplatzhalter 2">
             <a:extLst>
               <a:ext uri="{FF2B5EF4-FFF2-40B4-BE49-F238E27FC236}">
-                <a16:creationId xmlns:a16="http://schemas.microsoft.com/office/drawing/2014/main" id="{CF78D362-F6C6-4BD3-AD92-E9E63DE4CAA6}"/>
+                <a16:creationId xmlns:a16="http://schemas.microsoft.com/office/drawing/2014/main" id="{9993E090-E389-4754-AFF2-DE8CC3221A54}"/>
               </a:ext>
             </a:extLst>
           </p:cNvPr>
@@ -13870,47 +13450,399 @@
         </p:nvSpPr>
         <p:spPr/>
         <p:txBody>
-          <a:bodyPr/>
+          <a:bodyPr>
+            <a:normAutofit lnSpcReduction="10000"/>
+          </a:bodyPr>
           <a:lstStyle/>
           <a:p>
-            <a:endParaRPr lang="en-DE"/>
-          </a:p>
-        </p:txBody>
-      </p:sp>
-      <p:sp>
-        <p:nvSpPr>
-          <p:cNvPr id="4" name="Fußzeilenplatzhalter 3">
-            <a:extLst>
-              <a:ext uri="{FF2B5EF4-FFF2-40B4-BE49-F238E27FC236}">
-                <a16:creationId xmlns:a16="http://schemas.microsoft.com/office/drawing/2014/main" id="{F2F5EACC-AB92-4F82-8373-BC0536B20451}"/>
-              </a:ext>
-            </a:extLst>
-          </p:cNvPr>
-          <p:cNvSpPr>
-            <a:spLocks noGrp="1"/>
-          </p:cNvSpPr>
-          <p:nvPr>
-            <p:ph type="ftr" sz="quarter" idx="11"/>
-          </p:nvPr>
-        </p:nvSpPr>
-        <p:spPr/>
-        <p:txBody>
-          <a:bodyPr/>
-          <a:lstStyle/>
-          <a:p>
-            <a:pPr algn="l"/>
-            <a:r>
-              <a:rPr lang="en-US"/>
-              <a:t>Seminar: GIS Analyses with FOSSGIS    					 Speakers: Amandus Butzer, Julian Käflein</a:t>
-            </a:r>
-            <a:br>
-              <a:rPr lang="en-US"/>
-            </a:br>
-            <a:r>
-              <a:rPr lang="en-US"/>
-              <a:t>Teacher: Christina Ludwig							 			29.01.2019</a:t>
-            </a:r>
-            <a:endParaRPr lang="en-DE" dirty="0"/>
+            <a:r>
+              <a:rPr lang="de-DE" dirty="0" err="1"/>
+              <a:t>Accuracy</a:t>
+            </a:r>
+            <a:r>
+              <a:rPr lang="de-DE" dirty="0"/>
+              <a:t> </a:t>
+            </a:r>
+            <a:r>
+              <a:rPr lang="de-DE" dirty="0" err="1"/>
+              <a:t>of</a:t>
+            </a:r>
+            <a:r>
+              <a:rPr lang="de-DE" dirty="0"/>
+              <a:t> Luftdaten </a:t>
+            </a:r>
+            <a:r>
+              <a:rPr lang="de-DE" dirty="0" err="1"/>
+              <a:t>sensors</a:t>
+            </a:r>
+            <a:endParaRPr lang="de-DE" dirty="0"/>
+          </a:p>
+          <a:p>
+            <a:pPr lvl="1"/>
+            <a:r>
+              <a:rPr lang="de-DE" dirty="0"/>
+              <a:t>Need </a:t>
+            </a:r>
+            <a:r>
+              <a:rPr lang="de-DE" dirty="0" err="1"/>
+              <a:t>to</a:t>
+            </a:r>
+            <a:r>
+              <a:rPr lang="de-DE" dirty="0"/>
+              <a:t> </a:t>
+            </a:r>
+            <a:r>
+              <a:rPr lang="de-DE" dirty="0" err="1"/>
+              <a:t>filter</a:t>
+            </a:r>
+            <a:r>
+              <a:rPr lang="de-DE" dirty="0"/>
+              <a:t> extreme </a:t>
+            </a:r>
+            <a:r>
+              <a:rPr lang="de-DE" dirty="0" err="1"/>
+              <a:t>values</a:t>
+            </a:r>
+            <a:r>
+              <a:rPr lang="de-DE" dirty="0"/>
+              <a:t> (</a:t>
+            </a:r>
+            <a:r>
+              <a:rPr lang="de-DE" dirty="0" err="1"/>
+              <a:t>both</a:t>
+            </a:r>
+            <a:r>
+              <a:rPr lang="de-DE" dirty="0"/>
+              <a:t> absolute and relative) </a:t>
+            </a:r>
+          </a:p>
+          <a:p>
+            <a:pPr lvl="1"/>
+            <a:r>
+              <a:rPr lang="de-DE" dirty="0"/>
+              <a:t>Constant </a:t>
+            </a:r>
+            <a:r>
+              <a:rPr lang="de-DE" dirty="0" err="1"/>
+              <a:t>discrepancy</a:t>
+            </a:r>
+            <a:r>
+              <a:rPr lang="de-DE" dirty="0"/>
+              <a:t> </a:t>
+            </a:r>
+            <a:r>
+              <a:rPr lang="de-DE" dirty="0" err="1"/>
+              <a:t>to</a:t>
+            </a:r>
+            <a:r>
+              <a:rPr lang="de-DE" dirty="0"/>
+              <a:t> </a:t>
+            </a:r>
+            <a:r>
+              <a:rPr lang="de-DE" dirty="0" err="1"/>
+              <a:t>official</a:t>
+            </a:r>
+            <a:r>
+              <a:rPr lang="de-DE" dirty="0"/>
+              <a:t> </a:t>
+            </a:r>
+            <a:r>
+              <a:rPr lang="de-DE" dirty="0" err="1"/>
+              <a:t>measurements</a:t>
+            </a:r>
+            <a:endParaRPr lang="de-DE" dirty="0"/>
+          </a:p>
+          <a:p>
+            <a:pPr marL="201168" lvl="1" indent="0">
+              <a:buNone/>
+            </a:pPr>
+            <a:endParaRPr lang="de-DE" dirty="0"/>
+          </a:p>
+          <a:p>
+            <a:r>
+              <a:rPr lang="de-DE" dirty="0"/>
+              <a:t>Interpolation </a:t>
+            </a:r>
+            <a:r>
+              <a:rPr lang="de-DE" dirty="0" err="1"/>
+              <a:t>parameters</a:t>
+            </a:r>
+            <a:r>
+              <a:rPr lang="de-DE" dirty="0"/>
+              <a:t> </a:t>
+            </a:r>
+            <a:r>
+              <a:rPr lang="de-DE" dirty="0" err="1"/>
+              <a:t>are</a:t>
+            </a:r>
+            <a:r>
+              <a:rPr lang="de-DE" dirty="0"/>
+              <a:t> „</a:t>
+            </a:r>
+            <a:r>
+              <a:rPr lang="de-DE" dirty="0" err="1"/>
+              <a:t>best</a:t>
+            </a:r>
+            <a:r>
+              <a:rPr lang="de-DE" dirty="0"/>
+              <a:t> fit“</a:t>
+            </a:r>
+          </a:p>
+          <a:p>
+            <a:pPr lvl="1"/>
+            <a:r>
+              <a:rPr lang="de-DE" dirty="0" err="1"/>
+              <a:t>No</a:t>
+            </a:r>
+            <a:r>
+              <a:rPr lang="de-DE" dirty="0"/>
+              <a:t> ‚</a:t>
+            </a:r>
+            <a:r>
+              <a:rPr lang="de-DE" dirty="0" err="1"/>
+              <a:t>correct</a:t>
+            </a:r>
+            <a:r>
+              <a:rPr lang="de-DE" dirty="0"/>
+              <a:t>‘ </a:t>
+            </a:r>
+            <a:r>
+              <a:rPr lang="de-DE" dirty="0" err="1"/>
+              <a:t>solution</a:t>
+            </a:r>
+            <a:r>
+              <a:rPr lang="de-DE" dirty="0"/>
+              <a:t> </a:t>
+            </a:r>
+            <a:r>
+              <a:rPr lang="de-DE" dirty="0" err="1"/>
+              <a:t>to</a:t>
+            </a:r>
+            <a:r>
+              <a:rPr lang="de-DE" dirty="0"/>
+              <a:t> </a:t>
+            </a:r>
+            <a:r>
+              <a:rPr lang="de-DE" dirty="0" err="1"/>
+              <a:t>model</a:t>
+            </a:r>
+            <a:r>
+              <a:rPr lang="de-DE" dirty="0"/>
+              <a:t> </a:t>
+            </a:r>
+            <a:r>
+              <a:rPr lang="de-DE" dirty="0" err="1"/>
+              <a:t>pollution</a:t>
+            </a:r>
+            <a:r>
+              <a:rPr lang="de-DE" dirty="0"/>
+              <a:t> </a:t>
+            </a:r>
+            <a:r>
+              <a:rPr lang="de-DE" dirty="0" err="1"/>
+              <a:t>rasters</a:t>
+            </a:r>
+            <a:r>
+              <a:rPr lang="de-DE" dirty="0"/>
+              <a:t> </a:t>
+            </a:r>
+            <a:r>
+              <a:rPr lang="de-DE" dirty="0" err="1"/>
+              <a:t>from</a:t>
+            </a:r>
+            <a:r>
+              <a:rPr lang="de-DE" dirty="0"/>
+              <a:t> </a:t>
+            </a:r>
+            <a:r>
+              <a:rPr lang="de-DE" dirty="0" err="1"/>
+              <a:t>sensors</a:t>
+            </a:r>
+            <a:endParaRPr lang="de-DE" dirty="0"/>
+          </a:p>
+          <a:p>
+            <a:pPr marL="201168" lvl="1" indent="0">
+              <a:buNone/>
+            </a:pPr>
+            <a:endParaRPr lang="de-DE" dirty="0"/>
+          </a:p>
+          <a:p>
+            <a:r>
+              <a:rPr lang="de-DE" dirty="0"/>
+              <a:t>Small </a:t>
+            </a:r>
+            <a:r>
+              <a:rPr lang="de-DE" dirty="0" err="1"/>
+              <a:t>scale</a:t>
+            </a:r>
+            <a:r>
+              <a:rPr lang="de-DE" dirty="0"/>
+              <a:t> </a:t>
+            </a:r>
+            <a:r>
+              <a:rPr lang="de-DE" dirty="0" err="1"/>
+              <a:t>of</a:t>
+            </a:r>
+            <a:r>
+              <a:rPr lang="de-DE" dirty="0"/>
+              <a:t> </a:t>
+            </a:r>
+            <a:r>
+              <a:rPr lang="de-DE" dirty="0" err="1"/>
+              <a:t>study</a:t>
+            </a:r>
+            <a:r>
+              <a:rPr lang="de-DE" dirty="0"/>
+              <a:t> </a:t>
+            </a:r>
+            <a:r>
+              <a:rPr lang="de-DE" dirty="0" err="1"/>
+              <a:t>area</a:t>
+            </a:r>
+            <a:endParaRPr lang="de-DE" dirty="0"/>
+          </a:p>
+          <a:p>
+            <a:pPr lvl="1"/>
+            <a:r>
+              <a:rPr lang="de-DE" dirty="0"/>
+              <a:t>Large </a:t>
+            </a:r>
+            <a:r>
+              <a:rPr lang="de-DE" dirty="0" err="1"/>
+              <a:t>effects</a:t>
+            </a:r>
+            <a:r>
+              <a:rPr lang="de-DE" dirty="0"/>
+              <a:t> </a:t>
+            </a:r>
+            <a:r>
+              <a:rPr lang="de-DE" dirty="0" err="1"/>
+              <a:t>of</a:t>
+            </a:r>
+            <a:r>
+              <a:rPr lang="de-DE" dirty="0"/>
+              <a:t> additional </a:t>
+            </a:r>
+            <a:r>
+              <a:rPr lang="de-DE" dirty="0" err="1"/>
+              <a:t>factors</a:t>
+            </a:r>
+            <a:r>
+              <a:rPr lang="de-DE" dirty="0"/>
+              <a:t>, </a:t>
+            </a:r>
+            <a:r>
+              <a:rPr lang="de-DE" dirty="0" err="1"/>
+              <a:t>i.e</a:t>
+            </a:r>
+            <a:r>
+              <a:rPr lang="de-DE" dirty="0"/>
+              <a:t> </a:t>
+            </a:r>
+            <a:r>
+              <a:rPr lang="de-DE" dirty="0" err="1"/>
+              <a:t>atmospheric</a:t>
+            </a:r>
+            <a:r>
+              <a:rPr lang="de-DE" dirty="0"/>
+              <a:t> </a:t>
+            </a:r>
+            <a:r>
+              <a:rPr lang="de-DE" dirty="0" err="1"/>
+              <a:t>conditions</a:t>
+            </a:r>
+            <a:r>
+              <a:rPr lang="de-DE" dirty="0"/>
+              <a:t> (wind / </a:t>
+            </a:r>
+            <a:r>
+              <a:rPr lang="de-DE" dirty="0" err="1"/>
+              <a:t>precipitation</a:t>
+            </a:r>
+            <a:r>
+              <a:rPr lang="de-DE" dirty="0"/>
+              <a:t>) / </a:t>
+            </a:r>
+          </a:p>
+          <a:p>
+            <a:pPr marL="201168" lvl="1" indent="0">
+              <a:buNone/>
+            </a:pPr>
+            <a:r>
+              <a:rPr lang="de-DE" dirty="0"/>
+              <a:t>    </a:t>
+            </a:r>
+            <a:r>
+              <a:rPr lang="de-DE" dirty="0" err="1"/>
+              <a:t>land</a:t>
+            </a:r>
+            <a:r>
+              <a:rPr lang="de-DE" dirty="0"/>
+              <a:t> </a:t>
+            </a:r>
+            <a:r>
+              <a:rPr lang="de-DE" dirty="0" err="1"/>
+              <a:t>cover</a:t>
+            </a:r>
+            <a:r>
+              <a:rPr lang="de-DE" dirty="0"/>
+              <a:t> (</a:t>
+            </a:r>
+            <a:r>
+              <a:rPr lang="de-DE" dirty="0" err="1"/>
+              <a:t>buildings</a:t>
+            </a:r>
+            <a:r>
+              <a:rPr lang="de-DE" dirty="0"/>
+              <a:t> / </a:t>
+            </a:r>
+            <a:r>
+              <a:rPr lang="de-DE" dirty="0" err="1"/>
+              <a:t>parks</a:t>
+            </a:r>
+            <a:r>
+              <a:rPr lang="de-DE" dirty="0"/>
+              <a:t>)</a:t>
+            </a:r>
+          </a:p>
+          <a:p>
+            <a:pPr marL="201168" lvl="1" indent="0">
+              <a:buNone/>
+            </a:pPr>
+            <a:endParaRPr lang="de-DE" dirty="0"/>
+          </a:p>
+          <a:p>
+            <a:pPr marL="201168" lvl="1" indent="0">
+              <a:buNone/>
+            </a:pPr>
+            <a:r>
+              <a:rPr lang="de-DE" dirty="0"/>
+              <a:t>Short </a:t>
+            </a:r>
+            <a:r>
+              <a:rPr lang="de-DE" dirty="0" err="1"/>
+              <a:t>amount</a:t>
+            </a:r>
+            <a:r>
+              <a:rPr lang="de-DE" dirty="0"/>
+              <a:t> </a:t>
+            </a:r>
+            <a:r>
+              <a:rPr lang="de-DE" dirty="0" err="1"/>
+              <a:t>of</a:t>
+            </a:r>
+            <a:r>
+              <a:rPr lang="de-DE" dirty="0"/>
+              <a:t> </a:t>
+            </a:r>
+            <a:r>
+              <a:rPr lang="de-DE" dirty="0" err="1"/>
+              <a:t>sensing</a:t>
+            </a:r>
+            <a:r>
+              <a:rPr lang="de-DE" dirty="0"/>
+              <a:t> time</a:t>
+            </a:r>
           </a:p>
         </p:txBody>
       </p:sp>
@@ -13919,7 +13851,7 @@
           <p:cNvPr id="5" name="Foliennummernplatzhalter 4">
             <a:extLst>
               <a:ext uri="{FF2B5EF4-FFF2-40B4-BE49-F238E27FC236}">
-                <a16:creationId xmlns:a16="http://schemas.microsoft.com/office/drawing/2014/main" id="{C2BB6957-915A-41C6-860B-4974A31CF065}"/>
+                <a16:creationId xmlns:a16="http://schemas.microsoft.com/office/drawing/2014/main" id="{68CA6FEB-BDF5-4146-9132-CE78568122FF}"/>
               </a:ext>
             </a:extLst>
           </p:cNvPr>
@@ -13943,10 +13875,80 @@
           </a:p>
         </p:txBody>
       </p:sp>
+      <p:sp>
+        <p:nvSpPr>
+          <p:cNvPr id="6" name="Fußzeilenplatzhalter 3">
+            <a:extLst>
+              <a:ext uri="{FF2B5EF4-FFF2-40B4-BE49-F238E27FC236}">
+                <a16:creationId xmlns:a16="http://schemas.microsoft.com/office/drawing/2014/main" id="{B720173F-2071-4F06-97B1-6270805C9969}"/>
+              </a:ext>
+            </a:extLst>
+          </p:cNvPr>
+          <p:cNvSpPr>
+            <a:spLocks noGrp="1"/>
+          </p:cNvSpPr>
+          <p:nvPr>
+            <p:ph type="ftr" sz="quarter" idx="11"/>
+          </p:nvPr>
+        </p:nvSpPr>
+        <p:spPr>
+          <a:xfrm>
+            <a:off x="1557453" y="6459784"/>
+            <a:ext cx="9077094" cy="365125"/>
+          </a:xfrm>
+        </p:spPr>
+        <p:txBody>
+          <a:bodyPr/>
+          <a:lstStyle/>
+          <a:p>
+            <a:pPr algn="l"/>
+            <a:r>
+              <a:rPr lang="en-US" dirty="0"/>
+              <a:t>Seminar: GIS Analyses with FOSSGIS    					 Speakers: </a:t>
+            </a:r>
+            <a:r>
+              <a:rPr lang="en-US" dirty="0" err="1"/>
+              <a:t>Amandus</a:t>
+            </a:r>
+            <a:r>
+              <a:rPr lang="en-US" dirty="0"/>
+              <a:t> </a:t>
+            </a:r>
+            <a:r>
+              <a:rPr lang="en-US" dirty="0" err="1"/>
+              <a:t>Butzer</a:t>
+            </a:r>
+            <a:r>
+              <a:rPr lang="en-US" dirty="0"/>
+              <a:t>, Julian </a:t>
+            </a:r>
+            <a:r>
+              <a:rPr lang="en-US" dirty="0" err="1"/>
+              <a:t>Käflein</a:t>
+            </a:r>
+            <a:br>
+              <a:rPr lang="en-US"/>
+            </a:br>
+            <a:r>
+              <a:rPr lang="en-US"/>
+              <a:t>Teacher: </a:t>
+            </a:r>
+            <a:r>
+              <a:rPr lang="en-US" dirty="0"/>
+              <a:t>Christina Ludwig							 </a:t>
+            </a:r>
+            <a:r>
+              <a:rPr lang="en-US"/>
+              <a:t>	29.01.2019</a:t>
+            </a:r>
+            <a:endParaRPr lang="en-DE" dirty="0"/>
+          </a:p>
+        </p:txBody>
+      </p:sp>
     </p:spTree>
     <p:extLst>
       <p:ext uri="{BB962C8B-B14F-4D97-AF65-F5344CB8AC3E}">
-        <p14:creationId xmlns:p14="http://schemas.microsoft.com/office/powerpoint/2010/main" val="1279780823"/>
+        <p14:creationId xmlns:p14="http://schemas.microsoft.com/office/powerpoint/2010/main" val="4103345620"/>
       </p:ext>
     </p:extLst>
   </p:cSld>
@@ -14436,7 +14438,7 @@
           <p:cNvPr id="2" name="Titel 1">
             <a:extLst>
               <a:ext uri="{FF2B5EF4-FFF2-40B4-BE49-F238E27FC236}">
-                <a16:creationId xmlns:a16="http://schemas.microsoft.com/office/drawing/2014/main" id="{2F9A737C-1F96-4F6E-ADAA-F00A15C06577}"/>
+                <a16:creationId xmlns:a16="http://schemas.microsoft.com/office/drawing/2014/main" id="{30282CB8-7EA7-4E07-8047-7F80335FA284}"/>
               </a:ext>
             </a:extLst>
           </p:cNvPr>
@@ -14454,11 +14456,7 @@
           <a:p>
             <a:r>
               <a:rPr lang="de-DE" dirty="0"/>
-              <a:t>Data </a:t>
-            </a:r>
-            <a:r>
-              <a:rPr lang="de-DE" dirty="0" err="1"/>
-              <a:t>used</a:t>
+              <a:t>Sources</a:t>
             </a:r>
             <a:endParaRPr lang="en-DE" dirty="0"/>
           </a:p>
@@ -14469,7 +14467,7 @@
           <p:cNvPr id="3" name="Inhaltsplatzhalter 2">
             <a:extLst>
               <a:ext uri="{FF2B5EF4-FFF2-40B4-BE49-F238E27FC236}">
-                <a16:creationId xmlns:a16="http://schemas.microsoft.com/office/drawing/2014/main" id="{11082530-16BD-4F76-B5F6-178087E10AB9}"/>
+                <a16:creationId xmlns:a16="http://schemas.microsoft.com/office/drawing/2014/main" id="{CF78D362-F6C6-4BD3-AD92-E9E63DE4CAA6}"/>
               </a:ext>
             </a:extLst>
           </p:cNvPr>
@@ -14485,6 +14483,43 @@
           <a:bodyPr/>
           <a:lstStyle/>
           <a:p>
+            <a:endParaRPr lang="en-DE"/>
+          </a:p>
+        </p:txBody>
+      </p:sp>
+      <p:sp>
+        <p:nvSpPr>
+          <p:cNvPr id="4" name="Fußzeilenplatzhalter 3">
+            <a:extLst>
+              <a:ext uri="{FF2B5EF4-FFF2-40B4-BE49-F238E27FC236}">
+                <a16:creationId xmlns:a16="http://schemas.microsoft.com/office/drawing/2014/main" id="{F2F5EACC-AB92-4F82-8373-BC0536B20451}"/>
+              </a:ext>
+            </a:extLst>
+          </p:cNvPr>
+          <p:cNvSpPr>
+            <a:spLocks noGrp="1"/>
+          </p:cNvSpPr>
+          <p:nvPr>
+            <p:ph type="ftr" sz="quarter" idx="11"/>
+          </p:nvPr>
+        </p:nvSpPr>
+        <p:spPr/>
+        <p:txBody>
+          <a:bodyPr/>
+          <a:lstStyle/>
+          <a:p>
+            <a:pPr algn="l"/>
+            <a:r>
+              <a:rPr lang="en-US"/>
+              <a:t>Seminar: GIS Analyses with FOSSGIS    					 Speakers: Amandus Butzer, Julian Käflein</a:t>
+            </a:r>
+            <a:br>
+              <a:rPr lang="en-US"/>
+            </a:br>
+            <a:r>
+              <a:rPr lang="en-US"/>
+              <a:t>Teacher: Christina Ludwig							 			29.01.2019</a:t>
+            </a:r>
             <a:endParaRPr lang="en-DE" dirty="0"/>
           </a:p>
         </p:txBody>
@@ -14494,7 +14529,7 @@
           <p:cNvPr id="5" name="Foliennummernplatzhalter 4">
             <a:extLst>
               <a:ext uri="{FF2B5EF4-FFF2-40B4-BE49-F238E27FC236}">
-                <a16:creationId xmlns:a16="http://schemas.microsoft.com/office/drawing/2014/main" id="{73D94C5E-58FE-4C95-B70D-43E9906E0281}"/>
+                <a16:creationId xmlns:a16="http://schemas.microsoft.com/office/drawing/2014/main" id="{C2BB6957-915A-41C6-860B-4974A31CF065}"/>
               </a:ext>
             </a:extLst>
           </p:cNvPr>
@@ -14514,212 +14549,14 @@
               <a:rPr lang="en-DE" smtClean="0"/>
               <a:t>20</a:t>
             </a:fld>
-            <a:endParaRPr lang="en-DE" dirty="0"/>
-          </a:p>
-        </p:txBody>
-      </p:sp>
-      <p:sp>
-        <p:nvSpPr>
-          <p:cNvPr id="6" name="Textfeld 5">
-            <a:extLst>
-              <a:ext uri="{FF2B5EF4-FFF2-40B4-BE49-F238E27FC236}">
-                <a16:creationId xmlns:a16="http://schemas.microsoft.com/office/drawing/2014/main" id="{2933C20B-E24A-40D2-B63B-8AD3BADDECAA}"/>
-              </a:ext>
-            </a:extLst>
-          </p:cNvPr>
-          <p:cNvSpPr txBox="1"/>
-          <p:nvPr/>
-        </p:nvSpPr>
-        <p:spPr>
-          <a:xfrm>
-            <a:off x="838200" y="1825625"/>
-            <a:ext cx="4734808" cy="5447645"/>
-          </a:xfrm>
-          <a:prstGeom prst="rect">
-            <a:avLst/>
-          </a:prstGeom>
-          <a:noFill/>
-        </p:spPr>
-        <p:txBody>
-          <a:bodyPr wrap="square" rtlCol="0">
-            <a:spAutoFit/>
-          </a:bodyPr>
-          <a:lstStyle/>
-          <a:p>
-            <a:r>
-              <a:rPr lang="en-US" sz="1200" dirty="0"/>
-              <a:t>o3_today_min_limit</a:t>
-            </a:r>
-          </a:p>
-          <a:p>
-            <a:r>
-              <a:rPr lang="en-US" sz="1200" dirty="0"/>
-              <a:t>no2_yesterday_max_limit</a:t>
-            </a:r>
-          </a:p>
-          <a:p>
-            <a:r>
-              <a:rPr lang="en-US" sz="1200" dirty="0"/>
-              <a:t>pm25_yesterday_max_class</a:t>
-            </a:r>
-          </a:p>
-          <a:p>
-            <a:r>
-              <a:rPr lang="en-US" sz="1200" dirty="0"/>
-              <a:t>no2_udolink</a:t>
-            </a:r>
-          </a:p>
-          <a:p>
-            <a:r>
-              <a:rPr lang="en-US" sz="1200" dirty="0"/>
-              <a:t>pm25_today_avg</a:t>
-            </a:r>
-          </a:p>
-          <a:p>
-            <a:r>
-              <a:rPr lang="en-US" sz="1200" dirty="0"/>
-              <a:t>o3_today_max</a:t>
-            </a:r>
-          </a:p>
-          <a:p>
-            <a:r>
-              <a:rPr lang="en-US" sz="1200" dirty="0" err="1"/>
-              <a:t>luqx_today_max_comps</a:t>
-            </a:r>
-            <a:endParaRPr lang="en-US" sz="1200" dirty="0"/>
-          </a:p>
-          <a:p>
-            <a:r>
-              <a:rPr lang="en-US" sz="1200" dirty="0"/>
-              <a:t>o3_yesterday_min</a:t>
-            </a:r>
-          </a:p>
-          <a:p>
-            <a:r>
-              <a:rPr lang="en-US" sz="1200" dirty="0"/>
-              <a:t>o3_today_latest_ts</a:t>
-            </a:r>
-          </a:p>
-          <a:p>
-            <a:r>
-              <a:rPr lang="en-US" sz="1200" dirty="0"/>
-              <a:t>o3_today_latest</a:t>
-            </a:r>
-          </a:p>
-          <a:p>
-            <a:r>
-              <a:rPr lang="en-US" sz="1200" dirty="0"/>
-              <a:t>pm10_yesterday_min_class</a:t>
-            </a:r>
-          </a:p>
-          <a:p>
-            <a:r>
-              <a:rPr lang="en-US" sz="1200" dirty="0" err="1"/>
-              <a:t>luqx_yesterday_max_class</a:t>
-            </a:r>
-            <a:endParaRPr lang="en-US" sz="1200" dirty="0"/>
-          </a:p>
-          <a:p>
-            <a:r>
-              <a:rPr lang="en-US" sz="1200" dirty="0"/>
-              <a:t>no2_yesterday_latest_limit</a:t>
-            </a:r>
-          </a:p>
-          <a:p>
-            <a:r>
-              <a:rPr lang="en-US" sz="1200" dirty="0"/>
-              <a:t>pm25_yesterday_avg_limit</a:t>
-            </a:r>
-          </a:p>
-          <a:p>
-            <a:r>
-              <a:rPr lang="en-US" sz="1200" dirty="0"/>
-              <a:t>pm10_h_today_max_limit</a:t>
-            </a:r>
-          </a:p>
-          <a:p>
-            <a:r>
-              <a:rPr lang="en-US" sz="1200" dirty="0"/>
-              <a:t>pm10_yesterday_latest</a:t>
-            </a:r>
-          </a:p>
-          <a:p>
-            <a:r>
-              <a:rPr lang="en-US" sz="1200" dirty="0"/>
-              <a:t>pm25_h_yesterday_latest</a:t>
-            </a:r>
-          </a:p>
-          <a:p>
-            <a:r>
-              <a:rPr lang="en-US" sz="1200" dirty="0"/>
-              <a:t>o3_yesterday_latest_class</a:t>
-            </a:r>
-          </a:p>
-          <a:p>
-            <a:r>
-              <a:rPr lang="en-US" sz="1200" dirty="0"/>
-              <a:t>no2_yesterday_avg_class</a:t>
-            </a:r>
-          </a:p>
-          <a:p>
-            <a:r>
-              <a:rPr lang="en-US" sz="1200" dirty="0"/>
-              <a:t>o3_yesterday_avg_limit</a:t>
-            </a:r>
-          </a:p>
-          <a:p>
-            <a:r>
-              <a:rPr lang="en-US" sz="1200" dirty="0"/>
-              <a:t>o3_yesterday_max_limit</a:t>
-            </a:r>
-          </a:p>
-          <a:p>
-            <a:r>
-              <a:rPr lang="en-US" sz="1200" dirty="0" err="1"/>
-              <a:t>luqx_today_latest_text</a:t>
-            </a:r>
-            <a:endParaRPr lang="en-US" sz="1200" dirty="0"/>
-          </a:p>
-          <a:p>
-            <a:r>
-              <a:rPr lang="en-US" sz="1200" dirty="0" err="1"/>
-              <a:t>luqx_yesterday_max</a:t>
-            </a:r>
-            <a:endParaRPr lang="en-US" sz="1200" dirty="0"/>
-          </a:p>
-          <a:p>
-            <a:r>
-              <a:rPr lang="en-US" sz="1200" dirty="0"/>
-              <a:t>no2_today_latest_limit</a:t>
-            </a:r>
-          </a:p>
-          <a:p>
-            <a:r>
-              <a:rPr lang="en-US" sz="1200" dirty="0"/>
-              <a:t>pm10_udolink</a:t>
-            </a:r>
-          </a:p>
-          <a:p>
-            <a:r>
-              <a:rPr lang="en-US" sz="1200" dirty="0"/>
-              <a:t>pm10_h_today_avg_limit</a:t>
-            </a:r>
-          </a:p>
-          <a:p>
-            <a:r>
-              <a:rPr lang="en-US" sz="1200" dirty="0"/>
-              <a:t>pm10_h_today_max</a:t>
-            </a:r>
-          </a:p>
-          <a:p>
-            <a:endParaRPr lang="en-DE" sz="1200" dirty="0"/>
+            <a:endParaRPr lang="en-DE"/>
           </a:p>
         </p:txBody>
       </p:sp>
     </p:spTree>
     <p:extLst>
       <p:ext uri="{BB962C8B-B14F-4D97-AF65-F5344CB8AC3E}">
-        <p14:creationId xmlns:p14="http://schemas.microsoft.com/office/powerpoint/2010/main" val="2406927465"/>
+        <p14:creationId xmlns:p14="http://schemas.microsoft.com/office/powerpoint/2010/main" val="1279780823"/>
       </p:ext>
     </p:extLst>
   </p:cSld>
@@ -14748,10 +14585,97 @@
       </p:grpSpPr>
       <p:sp>
         <p:nvSpPr>
+          <p:cNvPr id="2" name="Titel 1">
+            <a:extLst>
+              <a:ext uri="{FF2B5EF4-FFF2-40B4-BE49-F238E27FC236}">
+                <a16:creationId xmlns:a16="http://schemas.microsoft.com/office/drawing/2014/main" id="{2F9A737C-1F96-4F6E-ADAA-F00A15C06577}"/>
+              </a:ext>
+            </a:extLst>
+          </p:cNvPr>
+          <p:cNvSpPr>
+            <a:spLocks noGrp="1"/>
+          </p:cNvSpPr>
+          <p:nvPr>
+            <p:ph type="title"/>
+          </p:nvPr>
+        </p:nvSpPr>
+        <p:spPr/>
+        <p:txBody>
+          <a:bodyPr/>
+          <a:lstStyle/>
+          <a:p>
+            <a:r>
+              <a:rPr lang="de-DE" dirty="0"/>
+              <a:t>Data </a:t>
+            </a:r>
+            <a:r>
+              <a:rPr lang="de-DE" dirty="0" err="1"/>
+              <a:t>used</a:t>
+            </a:r>
+            <a:endParaRPr lang="en-DE" dirty="0"/>
+          </a:p>
+        </p:txBody>
+      </p:sp>
+      <p:sp>
+        <p:nvSpPr>
+          <p:cNvPr id="3" name="Inhaltsplatzhalter 2">
+            <a:extLst>
+              <a:ext uri="{FF2B5EF4-FFF2-40B4-BE49-F238E27FC236}">
+                <a16:creationId xmlns:a16="http://schemas.microsoft.com/office/drawing/2014/main" id="{11082530-16BD-4F76-B5F6-178087E10AB9}"/>
+              </a:ext>
+            </a:extLst>
+          </p:cNvPr>
+          <p:cNvSpPr>
+            <a:spLocks noGrp="1"/>
+          </p:cNvSpPr>
+          <p:nvPr>
+            <p:ph idx="1"/>
+          </p:nvPr>
+        </p:nvSpPr>
+        <p:spPr/>
+        <p:txBody>
+          <a:bodyPr/>
+          <a:lstStyle/>
+          <a:p>
+            <a:endParaRPr lang="en-DE" dirty="0"/>
+          </a:p>
+        </p:txBody>
+      </p:sp>
+      <p:sp>
+        <p:nvSpPr>
+          <p:cNvPr id="5" name="Foliennummernplatzhalter 4">
+            <a:extLst>
+              <a:ext uri="{FF2B5EF4-FFF2-40B4-BE49-F238E27FC236}">
+                <a16:creationId xmlns:a16="http://schemas.microsoft.com/office/drawing/2014/main" id="{73D94C5E-58FE-4C95-B70D-43E9906E0281}"/>
+              </a:ext>
+            </a:extLst>
+          </p:cNvPr>
+          <p:cNvSpPr>
+            <a:spLocks noGrp="1"/>
+          </p:cNvSpPr>
+          <p:nvPr>
+            <p:ph type="sldNum" sz="quarter" idx="12"/>
+          </p:nvPr>
+        </p:nvSpPr>
+        <p:spPr/>
+        <p:txBody>
+          <a:bodyPr/>
+          <a:lstStyle/>
+          <a:p>
+            <a:fld id="{4AF462F5-4F09-48D4-8215-EEFD64917372}" type="slidenum">
+              <a:rPr lang="en-DE" smtClean="0"/>
+              <a:t>21</a:t>
+            </a:fld>
+            <a:endParaRPr lang="en-DE" dirty="0"/>
+          </a:p>
+        </p:txBody>
+      </p:sp>
+      <p:sp>
+        <p:nvSpPr>
           <p:cNvPr id="6" name="Textfeld 5">
             <a:extLst>
               <a:ext uri="{FF2B5EF4-FFF2-40B4-BE49-F238E27FC236}">
-                <a16:creationId xmlns:a16="http://schemas.microsoft.com/office/drawing/2014/main" id="{4F84EC84-F4C4-4A40-B5CA-7EF58B46013A}"/>
+                <a16:creationId xmlns:a16="http://schemas.microsoft.com/office/drawing/2014/main" id="{2933C20B-E24A-40D2-B63B-8AD3BADDECAA}"/>
               </a:ext>
             </a:extLst>
           </p:cNvPr>
@@ -14760,8 +14684,8 @@
         </p:nvSpPr>
         <p:spPr>
           <a:xfrm>
-            <a:off x="838200" y="0"/>
-            <a:ext cx="10515600" cy="7109639"/>
+            <a:off x="838200" y="1825625"/>
+            <a:ext cx="4734808" cy="5447645"/>
           </a:xfrm>
           <a:prstGeom prst="rect">
             <a:avLst/>
@@ -14775,308 +14699,185 @@
           <a:lstStyle/>
           <a:p>
             <a:r>
+              <a:rPr lang="en-US" sz="1200" dirty="0"/>
+              <a:t>o3_today_min_limit</a:t>
+            </a:r>
+          </a:p>
+          <a:p>
+            <a:r>
+              <a:rPr lang="en-US" sz="1200" dirty="0"/>
+              <a:t>no2_yesterday_max_limit</a:t>
+            </a:r>
+          </a:p>
+          <a:p>
+            <a:r>
+              <a:rPr lang="en-US" sz="1200" dirty="0"/>
+              <a:t>pm25_yesterday_max_class</a:t>
+            </a:r>
+          </a:p>
+          <a:p>
+            <a:r>
+              <a:rPr lang="en-US" sz="1200" dirty="0"/>
+              <a:t>no2_udolink</a:t>
+            </a:r>
+          </a:p>
+          <a:p>
+            <a:r>
+              <a:rPr lang="en-US" sz="1200" dirty="0"/>
+              <a:t>pm25_today_avg</a:t>
+            </a:r>
+          </a:p>
+          <a:p>
+            <a:r>
+              <a:rPr lang="en-US" sz="1200" dirty="0"/>
+              <a:t>o3_today_max</a:t>
+            </a:r>
+          </a:p>
+          <a:p>
+            <a:r>
               <a:rPr lang="en-US" sz="1200" dirty="0" err="1"/>
-              <a:t>rw</a:t>
+              <a:t>luqx_today_max_comps</a:t>
             </a:r>
             <a:endParaRPr lang="en-US" sz="1200" dirty="0"/>
           </a:p>
           <a:p>
             <a:r>
               <a:rPr lang="en-US" sz="1200" dirty="0"/>
-              <a:t>o3_today_avg_class</a:t>
+              <a:t>o3_yesterday_min</a:t>
             </a:r>
           </a:p>
           <a:p>
             <a:r>
               <a:rPr lang="en-US" sz="1200" dirty="0"/>
-              <a:t>pm10_yesterday_min_limit</a:t>
+              <a:t>o3_today_latest_ts</a:t>
             </a:r>
           </a:p>
           <a:p>
             <a:r>
               <a:rPr lang="en-US" sz="1200" dirty="0"/>
-              <a:t>no2_yesterday_latest_class</a:t>
+              <a:t>o3_today_latest</a:t>
             </a:r>
           </a:p>
           <a:p>
             <a:r>
               <a:rPr lang="en-US" sz="1200" dirty="0"/>
-              <a:t>pm10_yesterday_latest_class</a:t>
+              <a:t>pm10_yesterday_min_class</a:t>
             </a:r>
           </a:p>
           <a:p>
             <a:r>
               <a:rPr lang="en-US" sz="1200" dirty="0" err="1"/>
-              <a:t>luqx_today_max_class</a:t>
+              <a:t>luqx_yesterday_max_class</a:t>
             </a:r>
             <a:endParaRPr lang="en-US" sz="1200" dirty="0"/>
           </a:p>
           <a:p>
             <a:r>
               <a:rPr lang="en-US" sz="1200" dirty="0"/>
-              <a:t>o3_yesterday_latest_limit</a:t>
+              <a:t>no2_yesterday_latest_limit</a:t>
             </a:r>
           </a:p>
           <a:p>
             <a:r>
               <a:rPr lang="en-US" sz="1200" dirty="0"/>
-              <a:t>pm10_yesterday_latest_ts</a:t>
+              <a:t>pm25_yesterday_avg_limit</a:t>
             </a:r>
           </a:p>
           <a:p>
             <a:r>
               <a:rPr lang="en-US" sz="1200" dirty="0"/>
-              <a:t>pm10_yesterday_max</a:t>
+              <a:t>pm10_h_today_max_limit</a:t>
             </a:r>
           </a:p>
           <a:p>
             <a:r>
               <a:rPr lang="en-US" sz="1200" dirty="0"/>
-              <a:t>pm25_h_today_min_class</a:t>
+              <a:t>pm10_yesterday_latest</a:t>
             </a:r>
           </a:p>
           <a:p>
             <a:r>
               <a:rPr lang="en-US" sz="1200" dirty="0"/>
-              <a:t>pm25_h_yesterday_avg</a:t>
+              <a:t>pm25_h_yesterday_latest</a:t>
             </a:r>
           </a:p>
           <a:p>
             <a:r>
               <a:rPr lang="en-US" sz="1200" dirty="0"/>
-              <a:t>no2_yesterday_min</a:t>
+              <a:t>o3_yesterday_latest_class</a:t>
             </a:r>
           </a:p>
           <a:p>
             <a:r>
               <a:rPr lang="en-US" sz="1200" dirty="0"/>
-              <a:t>o3_yesterday_latest</a:t>
+              <a:t>no2_yesterday_avg_class</a:t>
+            </a:r>
+          </a:p>
+          <a:p>
+            <a:r>
+              <a:rPr lang="en-US" sz="1200" dirty="0"/>
+              <a:t>o3_yesterday_avg_limit</a:t>
+            </a:r>
+          </a:p>
+          <a:p>
+            <a:r>
+              <a:rPr lang="en-US" sz="1200" dirty="0"/>
+              <a:t>o3_yesterday_max_limit</a:t>
             </a:r>
           </a:p>
           <a:p>
             <a:r>
               <a:rPr lang="en-US" sz="1200" dirty="0" err="1"/>
-              <a:t>hoehe</a:t>
+              <a:t>luqx_today_latest_text</a:t>
             </a:r>
             <a:endParaRPr lang="en-US" sz="1200" dirty="0"/>
           </a:p>
           <a:p>
             <a:r>
               <a:rPr lang="en-US" sz="1200" dirty="0" err="1"/>
-              <a:t>luqx_yesterday_max_comps</a:t>
+              <a:t>luqx_yesterday_max</a:t>
             </a:r>
             <a:endParaRPr lang="en-US" sz="1200" dirty="0"/>
           </a:p>
           <a:p>
             <a:r>
               <a:rPr lang="en-US" sz="1200" dirty="0"/>
-              <a:t>pm25_yesterday_avg_class</a:t>
+              <a:t>no2_today_latest_limit</a:t>
             </a:r>
           </a:p>
           <a:p>
             <a:r>
               <a:rPr lang="en-US" sz="1200" dirty="0"/>
-              <a:t>o3_today_max_class</a:t>
+              <a:t>pm10_udolink</a:t>
             </a:r>
           </a:p>
           <a:p>
             <a:r>
               <a:rPr lang="en-US" sz="1200" dirty="0"/>
-              <a:t>pm10_h_today_latest</a:t>
-            </a:r>
-          </a:p>
-          <a:p>
-            <a:r>
-              <a:rPr lang="en-US" sz="1200" dirty="0" err="1"/>
-              <a:t>luqx_yesterday_max_text</a:t>
-            </a:r>
-            <a:endParaRPr lang="en-US" sz="1200" dirty="0"/>
+              <a:t>pm10_h_today_avg_limit</a:t>
+            </a:r>
           </a:p>
           <a:p>
             <a:r>
               <a:rPr lang="en-US" sz="1200" dirty="0"/>
-              <a:t>pm10_h_today_latest_ts</a:t>
-            </a:r>
-          </a:p>
-          <a:p>
-            <a:r>
-              <a:rPr lang="en-US" sz="1200" dirty="0" err="1"/>
-              <a:t>strasse</a:t>
-            </a:r>
-            <a:endParaRPr lang="en-US" sz="1200" dirty="0"/>
-          </a:p>
-          <a:p>
-            <a:r>
-              <a:rPr lang="en-US" sz="1200" dirty="0"/>
-              <a:t>pm25_h_today_min_limit</a:t>
-            </a:r>
-          </a:p>
-          <a:p>
-            <a:r>
-              <a:rPr lang="en-US" sz="1200" dirty="0"/>
-              <a:t>pm10_h_today_latest_limit</a:t>
-            </a:r>
-          </a:p>
-          <a:p>
-            <a:r>
-              <a:rPr lang="en-US" sz="1200" dirty="0"/>
-              <a:t>pm25_h_today_latest_ts</a:t>
-            </a:r>
-          </a:p>
-          <a:p>
-            <a:r>
-              <a:rPr lang="en-US" sz="1200" dirty="0"/>
-              <a:t>no2_today_latest_class</a:t>
-            </a:r>
-          </a:p>
-          <a:p>
-            <a:r>
-              <a:rPr lang="en-US" sz="1200" dirty="0"/>
-              <a:t>no2_yesterday_avg_limit</a:t>
-            </a:r>
-          </a:p>
-          <a:p>
-            <a:r>
-              <a:rPr lang="en-US" sz="1200" dirty="0"/>
-              <a:t>pm10_today_max</a:t>
-            </a:r>
-          </a:p>
-          <a:p>
-            <a:r>
-              <a:rPr lang="en-US" sz="1200" dirty="0"/>
-              <a:t>pm25_today_min</a:t>
-            </a:r>
-          </a:p>
-          <a:p>
-            <a:r>
-              <a:rPr lang="en-US" sz="1200" dirty="0"/>
-              <a:t>pm10_yesterday_avg_limit</a:t>
-            </a:r>
-          </a:p>
-          <a:p>
-            <a:r>
-              <a:rPr lang="en-US" sz="1200" dirty="0"/>
-              <a:t>pm25_yesterday_latest</a:t>
-            </a:r>
-          </a:p>
-          <a:p>
-            <a:r>
-              <a:rPr lang="en-US" sz="1200" dirty="0"/>
-              <a:t>no2_today_min_class</a:t>
-            </a:r>
-          </a:p>
-          <a:p>
-            <a:r>
-              <a:rPr lang="en-US" sz="1200" dirty="0"/>
-              <a:t>pm25_h_yesterday_min_limit</a:t>
-            </a:r>
-          </a:p>
-          <a:p>
-            <a:r>
-              <a:rPr lang="en-US" sz="1200" dirty="0"/>
-              <a:t>no2_today_latest</a:t>
-            </a:r>
-          </a:p>
-          <a:p>
-            <a:r>
-              <a:rPr lang="en-US" sz="1200" dirty="0" err="1"/>
-              <a:t>luqx_today_latest_ts</a:t>
-            </a:r>
-            <a:endParaRPr lang="en-US" sz="1200" dirty="0"/>
-          </a:p>
-          <a:p>
-            <a:r>
-              <a:rPr lang="en-US" sz="1200" dirty="0"/>
-              <a:t>no2_yesterday_latest_ts</a:t>
-            </a:r>
-          </a:p>
-          <a:p>
-            <a:r>
-              <a:rPr lang="en-US" sz="1200" dirty="0"/>
-              <a:t>pm25_h_yesterday_min</a:t>
-            </a:r>
-          </a:p>
-          <a:p>
-            <a:r>
-              <a:rPr lang="en-US" sz="1200" dirty="0"/>
-              <a:t>no2_yesterday_avg</a:t>
+              <a:t>pm10_h_today_max</a:t>
             </a:r>
           </a:p>
           <a:p>
             <a:endParaRPr lang="en-DE" sz="1200" dirty="0"/>
-          </a:p>
-        </p:txBody>
-      </p:sp>
-      <p:sp>
-        <p:nvSpPr>
-          <p:cNvPr id="3" name="Inhaltsplatzhalter 2">
-            <a:extLst>
-              <a:ext uri="{FF2B5EF4-FFF2-40B4-BE49-F238E27FC236}">
-                <a16:creationId xmlns:a16="http://schemas.microsoft.com/office/drawing/2014/main" id="{DC5DE934-1650-459B-86CD-A0983EC31266}"/>
-              </a:ext>
-            </a:extLst>
-          </p:cNvPr>
-          <p:cNvSpPr>
-            <a:spLocks noGrp="1"/>
-          </p:cNvSpPr>
-          <p:nvPr>
-            <p:ph idx="1"/>
-          </p:nvPr>
-        </p:nvSpPr>
-        <p:spPr/>
-        <p:txBody>
-          <a:bodyPr/>
-          <a:lstStyle/>
-          <a:p>
-            <a:pPr marL="0" indent="0">
-              <a:buNone/>
-            </a:pPr>
-            <a:endParaRPr lang="en-DE" dirty="0"/>
-          </a:p>
-        </p:txBody>
-      </p:sp>
-      <p:sp>
-        <p:nvSpPr>
-          <p:cNvPr id="5" name="Foliennummernplatzhalter 4">
-            <a:extLst>
-              <a:ext uri="{FF2B5EF4-FFF2-40B4-BE49-F238E27FC236}">
-                <a16:creationId xmlns:a16="http://schemas.microsoft.com/office/drawing/2014/main" id="{C98C828F-AE2D-4876-A0D2-43065A46FDA4}"/>
-              </a:ext>
-            </a:extLst>
-          </p:cNvPr>
-          <p:cNvSpPr>
-            <a:spLocks noGrp="1"/>
-          </p:cNvSpPr>
-          <p:nvPr>
-            <p:ph type="sldNum" sz="quarter" idx="12"/>
-          </p:nvPr>
-        </p:nvSpPr>
-        <p:spPr/>
-        <p:txBody>
-          <a:bodyPr/>
-          <a:lstStyle/>
-          <a:p>
-            <a:fld id="{4AF462F5-4F09-48D4-8215-EEFD64917372}" type="slidenum">
-              <a:rPr lang="en-DE" smtClean="0"/>
-              <a:t>21</a:t>
-            </a:fld>
-            <a:endParaRPr lang="en-DE"/>
           </a:p>
         </p:txBody>
       </p:sp>
     </p:spTree>
     <p:extLst>
       <p:ext uri="{BB962C8B-B14F-4D97-AF65-F5344CB8AC3E}">
-        <p14:creationId xmlns:p14="http://schemas.microsoft.com/office/powerpoint/2010/main" val="1208768836"/>
+        <p14:creationId xmlns:p14="http://schemas.microsoft.com/office/powerpoint/2010/main" val="2406927465"/>
       </p:ext>
     </p:extLst>
   </p:cSld>
   <p:clrMapOvr>
     <a:masterClrMapping/>
   </p:clrMapOvr>
-  <p:transition spd="slow">
-    <p:push dir="u"/>
-  </p:transition>
 </p:sld>
 </file>
 
@@ -15099,39 +14900,10 @@
       </p:grpSpPr>
       <p:sp>
         <p:nvSpPr>
-          <p:cNvPr id="5" name="Foliennummernplatzhalter 4">
-            <a:extLst>
-              <a:ext uri="{FF2B5EF4-FFF2-40B4-BE49-F238E27FC236}">
-                <a16:creationId xmlns:a16="http://schemas.microsoft.com/office/drawing/2014/main" id="{6B87B0A6-07B6-43D3-8F55-FDFB65F120A2}"/>
-              </a:ext>
-            </a:extLst>
-          </p:cNvPr>
-          <p:cNvSpPr>
-            <a:spLocks noGrp="1"/>
-          </p:cNvSpPr>
-          <p:nvPr>
-            <p:ph type="sldNum" sz="quarter" idx="12"/>
-          </p:nvPr>
-        </p:nvSpPr>
-        <p:spPr/>
-        <p:txBody>
-          <a:bodyPr/>
-          <a:lstStyle/>
-          <a:p>
-            <a:fld id="{4AF462F5-4F09-48D4-8215-EEFD64917372}" type="slidenum">
-              <a:rPr lang="en-DE" smtClean="0"/>
-              <a:t>22</a:t>
-            </a:fld>
-            <a:endParaRPr lang="en-DE"/>
-          </a:p>
-        </p:txBody>
-      </p:sp>
-      <p:sp>
-        <p:nvSpPr>
           <p:cNvPr id="6" name="Textfeld 5">
             <a:extLst>
               <a:ext uri="{FF2B5EF4-FFF2-40B4-BE49-F238E27FC236}">
-                <a16:creationId xmlns:a16="http://schemas.microsoft.com/office/drawing/2014/main" id="{6357FF38-3BDE-4097-83D1-AEEC3AAF3DAD}"/>
+                <a16:creationId xmlns:a16="http://schemas.microsoft.com/office/drawing/2014/main" id="{4F84EC84-F4C4-4A40-B5CA-7EF58B46013A}"/>
               </a:ext>
             </a:extLst>
           </p:cNvPr>
@@ -15140,8 +14912,8 @@
         </p:nvSpPr>
         <p:spPr>
           <a:xfrm>
-            <a:off x="838201" y="44605"/>
-            <a:ext cx="2590800" cy="7109639"/>
+            <a:off x="838200" y="0"/>
+            <a:ext cx="10515600" cy="7109639"/>
           </a:xfrm>
           <a:prstGeom prst="rect">
             <a:avLst/>
@@ -15155,240 +14927,299 @@
           <a:lstStyle/>
           <a:p>
             <a:r>
+              <a:rPr lang="en-US" sz="1200" dirty="0" err="1"/>
+              <a:t>rw</a:t>
+            </a:r>
+            <a:endParaRPr lang="en-US" sz="1200" dirty="0"/>
+          </a:p>
+          <a:p>
+            <a:r>
               <a:rPr lang="en-US" sz="1200" dirty="0"/>
-              <a:t>pm10_yesterday_max_limit</a:t>
+              <a:t>o3_today_avg_class</a:t>
+            </a:r>
+          </a:p>
+          <a:p>
+            <a:r>
+              <a:rPr lang="en-US" sz="1200" dirty="0"/>
+              <a:t>pm10_yesterday_min_limit</a:t>
+            </a:r>
+          </a:p>
+          <a:p>
+            <a:r>
+              <a:rPr lang="en-US" sz="1200" dirty="0"/>
+              <a:t>no2_yesterday_latest_class</a:t>
+            </a:r>
+          </a:p>
+          <a:p>
+            <a:r>
+              <a:rPr lang="en-US" sz="1200" dirty="0"/>
+              <a:t>pm10_yesterday_latest_class</a:t>
             </a:r>
           </a:p>
           <a:p>
             <a:r>
               <a:rPr lang="en-US" sz="1200" dirty="0" err="1"/>
-              <a:t>luqx_today_max_text</a:t>
+              <a:t>luqx_today_max_class</a:t>
             </a:r>
             <a:endParaRPr lang="en-US" sz="1200" dirty="0"/>
           </a:p>
           <a:p>
             <a:r>
               <a:rPr lang="en-US" sz="1200" dirty="0"/>
-              <a:t>o3_today_min_class</a:t>
+              <a:t>o3_yesterday_latest_limit</a:t>
             </a:r>
           </a:p>
           <a:p>
             <a:r>
               <a:rPr lang="en-US" sz="1200" dirty="0"/>
-              <a:t>pm25_yesterday_latest_limit</a:t>
+              <a:t>pm10_yesterday_latest_ts</a:t>
             </a:r>
           </a:p>
           <a:p>
             <a:r>
               <a:rPr lang="en-US" sz="1200" dirty="0"/>
-              <a:t>pm10_today_latest_limit</a:t>
+              <a:t>pm10_yesterday_max</a:t>
             </a:r>
           </a:p>
           <a:p>
             <a:r>
               <a:rPr lang="en-US" sz="1200" dirty="0"/>
-              <a:t>pm25_h_yesterday_latest_ts</a:t>
+              <a:t>pm25_h_today_min_class</a:t>
             </a:r>
           </a:p>
           <a:p>
             <a:r>
               <a:rPr lang="en-US" sz="1200" dirty="0"/>
-              <a:t>o3_today_min</a:t>
+              <a:t>pm25_h_yesterday_avg</a:t>
             </a:r>
           </a:p>
           <a:p>
             <a:r>
               <a:rPr lang="en-US" sz="1200" dirty="0"/>
-              <a:t>o3_yesterday_avg_class</a:t>
+              <a:t>no2_yesterday_min</a:t>
             </a:r>
           </a:p>
           <a:p>
             <a:r>
               <a:rPr lang="en-US" sz="1200" dirty="0"/>
-              <a:t>no2_yesterday_min_limit</a:t>
-            </a:r>
+              <a:t>o3_yesterday_latest</a:t>
+            </a:r>
+          </a:p>
+          <a:p>
+            <a:r>
+              <a:rPr lang="en-US" sz="1200" dirty="0" err="1"/>
+              <a:t>hoehe</a:t>
+            </a:r>
+            <a:endParaRPr lang="en-US" sz="1200" dirty="0"/>
+          </a:p>
+          <a:p>
+            <a:r>
+              <a:rPr lang="en-US" sz="1200" dirty="0" err="1"/>
+              <a:t>luqx_yesterday_max_comps</a:t>
+            </a:r>
+            <a:endParaRPr lang="en-US" sz="1200" dirty="0"/>
           </a:p>
           <a:p>
             <a:r>
               <a:rPr lang="en-US" sz="1200" dirty="0"/>
-              <a:t>pm25_h_today_avg_class</a:t>
+              <a:t>pm25_yesterday_avg_class</a:t>
             </a:r>
           </a:p>
           <a:p>
             <a:r>
               <a:rPr lang="en-US" sz="1200" dirty="0"/>
-              <a:t>pm25_yesterday_min_limit</a:t>
+              <a:t>o3_today_max_class</a:t>
             </a:r>
           </a:p>
           <a:p>
             <a:r>
               <a:rPr lang="en-US" sz="1200" dirty="0"/>
-              <a:t>o3_yesterday_max_class</a:t>
-            </a:r>
+              <a:t>pm10_h_today_latest</a:t>
+            </a:r>
+          </a:p>
+          <a:p>
+            <a:r>
+              <a:rPr lang="en-US" sz="1200" dirty="0" err="1"/>
+              <a:t>luqx_yesterday_max_text</a:t>
+            </a:r>
+            <a:endParaRPr lang="en-US" sz="1200" dirty="0"/>
           </a:p>
           <a:p>
             <a:r>
               <a:rPr lang="en-US" sz="1200" dirty="0"/>
-              <a:t>pm10_h_yesterday_latest_limit</a:t>
-            </a:r>
+              <a:t>pm10_h_today_latest_ts</a:t>
+            </a:r>
+          </a:p>
+          <a:p>
+            <a:r>
+              <a:rPr lang="en-US" sz="1200" dirty="0" err="1"/>
+              <a:t>strasse</a:t>
+            </a:r>
+            <a:endParaRPr lang="en-US" sz="1200" dirty="0"/>
           </a:p>
           <a:p>
             <a:r>
               <a:rPr lang="en-US" sz="1200" dirty="0"/>
-              <a:t>ort</a:t>
+              <a:t>pm25_h_today_min_limit</a:t>
             </a:r>
           </a:p>
           <a:p>
             <a:r>
               <a:rPr lang="en-US" sz="1200" dirty="0"/>
-              <a:t>pm25_yesterday_latest_ts</a:t>
+              <a:t>pm10_h_today_latest_limit</a:t>
             </a:r>
           </a:p>
           <a:p>
             <a:r>
               <a:rPr lang="en-US" sz="1200" dirty="0"/>
-              <a:t>pm25_h_udolink</a:t>
+              <a:t>pm25_h_today_latest_ts</a:t>
+            </a:r>
+          </a:p>
+          <a:p>
+            <a:r>
+              <a:rPr lang="en-US" sz="1200" dirty="0"/>
+              <a:t>no2_today_latest_class</a:t>
+            </a:r>
+          </a:p>
+          <a:p>
+            <a:r>
+              <a:rPr lang="en-US" sz="1200" dirty="0"/>
+              <a:t>no2_yesterday_avg_limit</a:t>
+            </a:r>
+          </a:p>
+          <a:p>
+            <a:r>
+              <a:rPr lang="en-US" sz="1200" dirty="0"/>
+              <a:t>pm10_today_max</a:t>
+            </a:r>
+          </a:p>
+          <a:p>
+            <a:r>
+              <a:rPr lang="en-US" sz="1200" dirty="0"/>
+              <a:t>pm25_today_min</a:t>
+            </a:r>
+          </a:p>
+          <a:p>
+            <a:r>
+              <a:rPr lang="en-US" sz="1200" dirty="0"/>
+              <a:t>pm10_yesterday_avg_limit</a:t>
+            </a:r>
+          </a:p>
+          <a:p>
+            <a:r>
+              <a:rPr lang="en-US" sz="1200" dirty="0"/>
+              <a:t>pm25_yesterday_latest</a:t>
+            </a:r>
+          </a:p>
+          <a:p>
+            <a:r>
+              <a:rPr lang="en-US" sz="1200" dirty="0"/>
+              <a:t>no2_today_min_class</a:t>
+            </a:r>
+          </a:p>
+          <a:p>
+            <a:r>
+              <a:rPr lang="en-US" sz="1200" dirty="0"/>
+              <a:t>pm25_h_yesterday_min_limit</a:t>
+            </a:r>
+          </a:p>
+          <a:p>
+            <a:r>
+              <a:rPr lang="en-US" sz="1200" dirty="0"/>
+              <a:t>no2_today_latest</a:t>
             </a:r>
           </a:p>
           <a:p>
             <a:r>
               <a:rPr lang="en-US" sz="1200" dirty="0" err="1"/>
-              <a:t>nuts_unit</a:t>
+              <a:t>luqx_today_latest_ts</a:t>
             </a:r>
             <a:endParaRPr lang="en-US" sz="1200" dirty="0"/>
           </a:p>
           <a:p>
             <a:r>
               <a:rPr lang="en-US" sz="1200" dirty="0"/>
-              <a:t>pm25_today_latest_limit</a:t>
+              <a:t>no2_yesterday_latest_ts</a:t>
             </a:r>
           </a:p>
           <a:p>
             <a:r>
               <a:rPr lang="en-US" sz="1200" dirty="0"/>
-              <a:t>type</a:t>
-            </a:r>
-          </a:p>
-          <a:p>
-            <a:r>
-              <a:rPr lang="en-US" sz="1200" dirty="0" err="1"/>
-              <a:t>hw</a:t>
-            </a:r>
-            <a:endParaRPr lang="en-US" sz="1200" dirty="0"/>
+              <a:t>pm25_h_yesterday_min</a:t>
+            </a:r>
           </a:p>
           <a:p>
             <a:r>
               <a:rPr lang="en-US" sz="1200" dirty="0"/>
-              <a:t>pm25_yesterday_latest_class</a:t>
-            </a:r>
-          </a:p>
-          <a:p>
-            <a:r>
-              <a:rPr lang="en-US" sz="1200" dirty="0"/>
-              <a:t>pm10_h_yesterday_min_limit</a:t>
-            </a:r>
-          </a:p>
-          <a:p>
-            <a:r>
-              <a:rPr lang="en-US" sz="1200" dirty="0"/>
-              <a:t>pm10_today_avg_limit</a:t>
-            </a:r>
-          </a:p>
-          <a:p>
-            <a:r>
-              <a:rPr lang="en-US" sz="1200" dirty="0"/>
-              <a:t>no2_today_avg</a:t>
-            </a:r>
-          </a:p>
-          <a:p>
-            <a:r>
-              <a:rPr lang="en-US" sz="1200" dirty="0" err="1"/>
-              <a:t>luqx_yesterday_max_ts_raw</a:t>
-            </a:r>
-            <a:endParaRPr lang="en-US" sz="1200" dirty="0"/>
-          </a:p>
-          <a:p>
-            <a:r>
-              <a:rPr lang="en-US" sz="1200" dirty="0"/>
-              <a:t>pm10_h_yesterday_avg_class</a:t>
-            </a:r>
-          </a:p>
-          <a:p>
-            <a:r>
-              <a:rPr lang="en-US" sz="1200" dirty="0"/>
-              <a:t>no2_today_avg_limit</a:t>
-            </a:r>
-          </a:p>
-          <a:p>
-            <a:r>
-              <a:rPr lang="en-US" sz="1200" dirty="0"/>
-              <a:t>pm25_h_yesterday_max_limit</a:t>
-            </a:r>
-          </a:p>
-          <a:p>
-            <a:r>
-              <a:rPr lang="en-US" sz="1200" dirty="0"/>
-              <a:t>pm10_h_yesterday_min</a:t>
-            </a:r>
-          </a:p>
-          <a:p>
-            <a:r>
-              <a:rPr lang="en-US" sz="1200" dirty="0" err="1"/>
-              <a:t>foto</a:t>
-            </a:r>
-            <a:endParaRPr lang="en-US" sz="1200" dirty="0"/>
-          </a:p>
-          <a:p>
-            <a:r>
-              <a:rPr lang="en-US" sz="1200" dirty="0"/>
-              <a:t>pm10_today_max_limit</a:t>
-            </a:r>
-          </a:p>
-          <a:p>
-            <a:r>
-              <a:rPr lang="en-US" sz="1200" dirty="0"/>
-              <a:t>pm25_h_yesterday_avg_limit</a:t>
-            </a:r>
-          </a:p>
-          <a:p>
-            <a:r>
-              <a:rPr lang="en-US" sz="1200" dirty="0"/>
-              <a:t>pm25_today_latest_class</a:t>
-            </a:r>
-          </a:p>
-          <a:p>
-            <a:r>
-              <a:rPr lang="en-US" sz="1200" dirty="0"/>
-              <a:t>pm25_today_max_limit</a:t>
-            </a:r>
-          </a:p>
-          <a:p>
-            <a:r>
-              <a:rPr lang="en-US" sz="1200" dirty="0"/>
-              <a:t>pm25_h_today_avg</a:t>
-            </a:r>
-          </a:p>
-          <a:p>
-            <a:r>
-              <a:rPr lang="en-US" sz="1200" dirty="0"/>
-              <a:t>pm10_h_yesterday_latest_ts</a:t>
-            </a:r>
-          </a:p>
-          <a:p>
-            <a:r>
-              <a:rPr lang="en-US" sz="1200" dirty="0"/>
-              <a:t>no2_yesterday_max</a:t>
-            </a:r>
-          </a:p>
-          <a:p>
-            <a:endParaRPr lang="en-US" sz="1200" dirty="0"/>
+              <a:t>no2_yesterday_avg</a:t>
+            </a:r>
+          </a:p>
+          <a:p>
+            <a:endParaRPr lang="en-DE" sz="1200" dirty="0"/>
+          </a:p>
+        </p:txBody>
+      </p:sp>
+      <p:sp>
+        <p:nvSpPr>
+          <p:cNvPr id="3" name="Inhaltsplatzhalter 2">
+            <a:extLst>
+              <a:ext uri="{FF2B5EF4-FFF2-40B4-BE49-F238E27FC236}">
+                <a16:creationId xmlns:a16="http://schemas.microsoft.com/office/drawing/2014/main" id="{DC5DE934-1650-459B-86CD-A0983EC31266}"/>
+              </a:ext>
+            </a:extLst>
+          </p:cNvPr>
+          <p:cNvSpPr>
+            <a:spLocks noGrp="1"/>
+          </p:cNvSpPr>
+          <p:nvPr>
+            <p:ph idx="1"/>
+          </p:nvPr>
+        </p:nvSpPr>
+        <p:spPr/>
+        <p:txBody>
+          <a:bodyPr/>
+          <a:lstStyle/>
+          <a:p>
+            <a:pPr marL="0" indent="0">
+              <a:buNone/>
+            </a:pPr>
+            <a:endParaRPr lang="en-DE" dirty="0"/>
+          </a:p>
+        </p:txBody>
+      </p:sp>
+      <p:sp>
+        <p:nvSpPr>
+          <p:cNvPr id="5" name="Foliennummernplatzhalter 4">
+            <a:extLst>
+              <a:ext uri="{FF2B5EF4-FFF2-40B4-BE49-F238E27FC236}">
+                <a16:creationId xmlns:a16="http://schemas.microsoft.com/office/drawing/2014/main" id="{C98C828F-AE2D-4876-A0D2-43065A46FDA4}"/>
+              </a:ext>
+            </a:extLst>
+          </p:cNvPr>
+          <p:cNvSpPr>
+            <a:spLocks noGrp="1"/>
+          </p:cNvSpPr>
+          <p:nvPr>
+            <p:ph type="sldNum" sz="quarter" idx="12"/>
+          </p:nvPr>
+        </p:nvSpPr>
+        <p:spPr/>
+        <p:txBody>
+          <a:bodyPr/>
+          <a:lstStyle/>
+          <a:p>
+            <a:fld id="{4AF462F5-4F09-48D4-8215-EEFD64917372}" type="slidenum">
+              <a:rPr lang="en-DE" smtClean="0"/>
+              <a:t>22</a:t>
+            </a:fld>
+            <a:endParaRPr lang="en-DE"/>
           </a:p>
         </p:txBody>
       </p:sp>
     </p:spTree>
     <p:extLst>
       <p:ext uri="{BB962C8B-B14F-4D97-AF65-F5344CB8AC3E}">
-        <p14:creationId xmlns:p14="http://schemas.microsoft.com/office/powerpoint/2010/main" val="2152663588"/>
+        <p14:creationId xmlns:p14="http://schemas.microsoft.com/office/powerpoint/2010/main" val="1208768836"/>
       </p:ext>
     </p:extLst>
   </p:cSld>
@@ -15423,7 +15254,7 @@
           <p:cNvPr id="5" name="Foliennummernplatzhalter 4">
             <a:extLst>
               <a:ext uri="{FF2B5EF4-FFF2-40B4-BE49-F238E27FC236}">
-                <a16:creationId xmlns:a16="http://schemas.microsoft.com/office/drawing/2014/main" id="{3147EB66-A9FB-49E5-9E3A-54D7C7017958}"/>
+                <a16:creationId xmlns:a16="http://schemas.microsoft.com/office/drawing/2014/main" id="{6B87B0A6-07B6-43D3-8F55-FDFB65F120A2}"/>
               </a:ext>
             </a:extLst>
           </p:cNvPr>
@@ -15452,7 +15283,7 @@
           <p:cNvPr id="6" name="Textfeld 5">
             <a:extLst>
               <a:ext uri="{FF2B5EF4-FFF2-40B4-BE49-F238E27FC236}">
-                <a16:creationId xmlns:a16="http://schemas.microsoft.com/office/drawing/2014/main" id="{9FB39698-5A04-4CD9-B5B3-6D3A19F1D99A}"/>
+                <a16:creationId xmlns:a16="http://schemas.microsoft.com/office/drawing/2014/main" id="{6357FF38-3BDE-4097-83D1-AEEC3AAF3DAD}"/>
               </a:ext>
             </a:extLst>
           </p:cNvPr>
@@ -15461,8 +15292,8 @@
         </p:nvSpPr>
         <p:spPr>
           <a:xfrm>
-            <a:off x="838200" y="0"/>
-            <a:ext cx="5540298" cy="6924973"/>
+            <a:off x="838201" y="44605"/>
+            <a:ext cx="2590800" cy="7109639"/>
           </a:xfrm>
           <a:prstGeom prst="rect">
             <a:avLst/>
@@ -15476,243 +15307,240 @@
           <a:lstStyle/>
           <a:p>
             <a:r>
+              <a:rPr lang="en-US" sz="1200" dirty="0"/>
+              <a:t>pm10_yesterday_max_limit</a:t>
+            </a:r>
+          </a:p>
+          <a:p>
+            <a:r>
               <a:rPr lang="en-US" sz="1200" dirty="0" err="1"/>
-              <a:t>luqx_today_latest</a:t>
+              <a:t>luqx_today_max_text</a:t>
             </a:r>
             <a:endParaRPr lang="en-US" sz="1200" dirty="0"/>
           </a:p>
           <a:p>
             <a:r>
               <a:rPr lang="en-US" sz="1200" dirty="0"/>
-              <a:t>pm10_today_min</a:t>
+              <a:t>o3_today_min_class</a:t>
+            </a:r>
+          </a:p>
+          <a:p>
+            <a:r>
+              <a:rPr lang="en-US" sz="1200" dirty="0"/>
+              <a:t>pm25_yesterday_latest_limit</a:t>
+            </a:r>
+          </a:p>
+          <a:p>
+            <a:r>
+              <a:rPr lang="en-US" sz="1200" dirty="0"/>
+              <a:t>pm10_today_latest_limit</a:t>
+            </a:r>
+          </a:p>
+          <a:p>
+            <a:r>
+              <a:rPr lang="en-US" sz="1200" dirty="0"/>
+              <a:t>pm25_h_yesterday_latest_ts</a:t>
+            </a:r>
+          </a:p>
+          <a:p>
+            <a:r>
+              <a:rPr lang="en-US" sz="1200" dirty="0"/>
+              <a:t>o3_today_min</a:t>
+            </a:r>
+          </a:p>
+          <a:p>
+            <a:r>
+              <a:rPr lang="en-US" sz="1200" dirty="0"/>
+              <a:t>o3_yesterday_avg_class</a:t>
+            </a:r>
+          </a:p>
+          <a:p>
+            <a:r>
+              <a:rPr lang="en-US" sz="1200" dirty="0"/>
+              <a:t>no2_yesterday_min_limit</a:t>
+            </a:r>
+          </a:p>
+          <a:p>
+            <a:r>
+              <a:rPr lang="en-US" sz="1200" dirty="0"/>
+              <a:t>pm25_h_today_avg_class</a:t>
+            </a:r>
+          </a:p>
+          <a:p>
+            <a:r>
+              <a:rPr lang="en-US" sz="1200" dirty="0"/>
+              <a:t>pm25_yesterday_min_limit</a:t>
+            </a:r>
+          </a:p>
+          <a:p>
+            <a:r>
+              <a:rPr lang="en-US" sz="1200" dirty="0"/>
+              <a:t>o3_yesterday_max_class</a:t>
+            </a:r>
+          </a:p>
+          <a:p>
+            <a:r>
+              <a:rPr lang="en-US" sz="1200" dirty="0"/>
+              <a:t>pm10_h_yesterday_latest_limit</a:t>
+            </a:r>
+          </a:p>
+          <a:p>
+            <a:r>
+              <a:rPr lang="en-US" sz="1200" dirty="0"/>
+              <a:t>ort</a:t>
+            </a:r>
+          </a:p>
+          <a:p>
+            <a:r>
+              <a:rPr lang="en-US" sz="1200" dirty="0"/>
+              <a:t>pm25_yesterday_latest_ts</a:t>
+            </a:r>
+          </a:p>
+          <a:p>
+            <a:r>
+              <a:rPr lang="en-US" sz="1200" dirty="0"/>
+              <a:t>pm25_h_udolink</a:t>
             </a:r>
           </a:p>
           <a:p>
             <a:r>
               <a:rPr lang="en-US" sz="1200" dirty="0" err="1"/>
-              <a:t>lon</a:t>
+              <a:t>nuts_unit</a:t>
             </a:r>
             <a:endParaRPr lang="en-US" sz="1200" dirty="0"/>
           </a:p>
           <a:p>
             <a:r>
               <a:rPr lang="en-US" sz="1200" dirty="0"/>
-              <a:t>pm10_h_today_min</a:t>
+              <a:t>pm25_today_latest_limit</a:t>
             </a:r>
           </a:p>
           <a:p>
             <a:r>
               <a:rPr lang="en-US" sz="1200" dirty="0"/>
-              <a:t>no2_today_avg_class</a:t>
+              <a:t>type</a:t>
             </a:r>
           </a:p>
           <a:p>
             <a:r>
               <a:rPr lang="en-US" sz="1200" dirty="0" err="1"/>
-              <a:t>luqx_today_max</a:t>
+              <a:t>hw</a:t>
             </a:r>
             <a:endParaRPr lang="en-US" sz="1200" dirty="0"/>
           </a:p>
           <a:p>
             <a:r>
               <a:rPr lang="en-US" sz="1200" dirty="0"/>
-              <a:t>pm10_today_avg_class</a:t>
+              <a:t>pm25_yesterday_latest_class</a:t>
             </a:r>
           </a:p>
           <a:p>
             <a:r>
               <a:rPr lang="en-US" sz="1200" dirty="0"/>
-              <a:t>o3_today_avg</a:t>
+              <a:t>pm10_h_yesterday_min_limit</a:t>
+            </a:r>
+          </a:p>
+          <a:p>
+            <a:r>
+              <a:rPr lang="en-US" sz="1200" dirty="0"/>
+              <a:t>pm10_today_avg_limit</a:t>
+            </a:r>
+          </a:p>
+          <a:p>
+            <a:r>
+              <a:rPr lang="en-US" sz="1200" dirty="0"/>
+              <a:t>no2_today_avg</a:t>
             </a:r>
           </a:p>
           <a:p>
             <a:r>
               <a:rPr lang="en-US" sz="1200" dirty="0" err="1"/>
-              <a:t>keyattname</a:t>
+              <a:t>luqx_yesterday_max_ts_raw</a:t>
             </a:r>
             <a:endParaRPr lang="en-US" sz="1200" dirty="0"/>
           </a:p>
           <a:p>
             <a:r>
+              <a:rPr lang="en-US" sz="1200" dirty="0"/>
+              <a:t>pm10_h_yesterday_avg_class</a:t>
+            </a:r>
+          </a:p>
+          <a:p>
+            <a:r>
+              <a:rPr lang="en-US" sz="1200" dirty="0"/>
+              <a:t>no2_today_avg_limit</a:t>
+            </a:r>
+          </a:p>
+          <a:p>
+            <a:r>
+              <a:rPr lang="en-US" sz="1200" dirty="0"/>
+              <a:t>pm25_h_yesterday_max_limit</a:t>
+            </a:r>
+          </a:p>
+          <a:p>
+            <a:r>
+              <a:rPr lang="en-US" sz="1200" dirty="0"/>
+              <a:t>pm10_h_yesterday_min</a:t>
+            </a:r>
+          </a:p>
+          <a:p>
+            <a:r>
               <a:rPr lang="en-US" sz="1200" dirty="0" err="1"/>
-              <a:t>luqx_yesterday_max_ts</a:t>
+              <a:t>foto</a:t>
             </a:r>
             <a:endParaRPr lang="en-US" sz="1200" dirty="0"/>
           </a:p>
           <a:p>
             <a:r>
-              <a:rPr lang="en-US" sz="1200" dirty="0" err="1"/>
-              <a:t>kurzname</a:t>
-            </a:r>
+              <a:rPr lang="en-US" sz="1200" dirty="0"/>
+              <a:t>pm10_today_max_limit</a:t>
+            </a:r>
+          </a:p>
+          <a:p>
+            <a:r>
+              <a:rPr lang="en-US" sz="1200" dirty="0"/>
+              <a:t>pm25_h_yesterday_avg_limit</a:t>
+            </a:r>
+          </a:p>
+          <a:p>
+            <a:r>
+              <a:rPr lang="en-US" sz="1200" dirty="0"/>
+              <a:t>pm25_today_latest_class</a:t>
+            </a:r>
+          </a:p>
+          <a:p>
+            <a:r>
+              <a:rPr lang="en-US" sz="1200" dirty="0"/>
+              <a:t>pm25_today_max_limit</a:t>
+            </a:r>
+          </a:p>
+          <a:p>
+            <a:r>
+              <a:rPr lang="en-US" sz="1200" dirty="0"/>
+              <a:t>pm25_h_today_avg</a:t>
+            </a:r>
+          </a:p>
+          <a:p>
+            <a:r>
+              <a:rPr lang="en-US" sz="1200" dirty="0"/>
+              <a:t>pm10_h_yesterday_latest_ts</a:t>
+            </a:r>
+          </a:p>
+          <a:p>
+            <a:r>
+              <a:rPr lang="en-US" sz="1200" dirty="0"/>
+              <a:t>no2_yesterday_max</a:t>
+            </a:r>
+          </a:p>
+          <a:p>
             <a:endParaRPr lang="en-US" sz="1200" dirty="0"/>
-          </a:p>
-          <a:p>
-            <a:r>
-              <a:rPr lang="en-US" sz="1200" dirty="0"/>
-              <a:t>o3_yesterday_max</a:t>
-            </a:r>
-          </a:p>
-          <a:p>
-            <a:r>
-              <a:rPr lang="en-US" sz="1200" dirty="0" err="1"/>
-              <a:t>yesterday_ts</a:t>
-            </a:r>
-            <a:endParaRPr lang="en-US" sz="1200" dirty="0"/>
-          </a:p>
-          <a:p>
-            <a:r>
-              <a:rPr lang="en-US" sz="1200" dirty="0"/>
-              <a:t>pm10_yesterday_min</a:t>
-            </a:r>
-          </a:p>
-          <a:p>
-            <a:r>
-              <a:rPr lang="en-US" sz="1200" dirty="0"/>
-              <a:t>pm10_h_yesterday_max_class</a:t>
-            </a:r>
-          </a:p>
-          <a:p>
-            <a:r>
-              <a:rPr lang="en-US" sz="1200" dirty="0"/>
-              <a:t>pm25_h_yesterday_max_class</a:t>
-            </a:r>
-          </a:p>
-          <a:p>
-            <a:r>
-              <a:rPr lang="en-US" sz="1200" dirty="0"/>
-              <a:t>pm25_yesterday_min</a:t>
-            </a:r>
-          </a:p>
-          <a:p>
-            <a:r>
-              <a:rPr lang="en-US" sz="1200" dirty="0"/>
-              <a:t>no2_today_max_limit</a:t>
-            </a:r>
-          </a:p>
-          <a:p>
-            <a:r>
-              <a:rPr lang="en-US" sz="1200" dirty="0"/>
-              <a:t>pm10_h_today_min_class</a:t>
-            </a:r>
-          </a:p>
-          <a:p>
-            <a:r>
-              <a:rPr lang="en-US" sz="1200" dirty="0"/>
-              <a:t>pm25_today_max_class</a:t>
-            </a:r>
-          </a:p>
-          <a:p>
-            <a:r>
-              <a:rPr lang="en-US" sz="1200" dirty="0"/>
-              <a:t>pm10_today_max_class</a:t>
-            </a:r>
-          </a:p>
-          <a:p>
-            <a:r>
-              <a:rPr lang="en-US" sz="1200" dirty="0"/>
-              <a:t>o3_yesterday_min_class</a:t>
-            </a:r>
-          </a:p>
-          <a:p>
-            <a:r>
-              <a:rPr lang="en-US" sz="1200" dirty="0"/>
-              <a:t>pm25_h_yesterday_avg_class</a:t>
-            </a:r>
-          </a:p>
-          <a:p>
-            <a:r>
-              <a:rPr lang="en-US" sz="1200" dirty="0"/>
-              <a:t>pm10_today_latest</a:t>
-            </a:r>
-          </a:p>
-          <a:p>
-            <a:r>
-              <a:rPr lang="en-US" sz="1200" dirty="0"/>
-              <a:t>pm25_h_today_latest</a:t>
-            </a:r>
-          </a:p>
-          <a:p>
-            <a:r>
-              <a:rPr lang="en-US" sz="1200" dirty="0" err="1"/>
-              <a:t>luqx_today_max_ts_raw</a:t>
-            </a:r>
-            <a:endParaRPr lang="en-US" sz="1200" dirty="0"/>
-          </a:p>
-          <a:p>
-            <a:r>
-              <a:rPr lang="en-US" sz="1200" dirty="0"/>
-              <a:t>no2_today_latest_ts</a:t>
-            </a:r>
-          </a:p>
-          <a:p>
-            <a:r>
-              <a:rPr lang="en-US" sz="1200" dirty="0"/>
-              <a:t>pm25_today_latest</a:t>
-            </a:r>
-          </a:p>
-          <a:p>
-            <a:r>
-              <a:rPr lang="en-US" sz="1200" dirty="0" err="1"/>
-              <a:t>statkenn</a:t>
-            </a:r>
-            <a:endParaRPr lang="en-US" sz="1200" dirty="0"/>
-          </a:p>
-          <a:p>
-            <a:r>
-              <a:rPr lang="en-US" sz="1200" dirty="0"/>
-              <a:t>pm25_h_yesterday_min_class</a:t>
-            </a:r>
-          </a:p>
-          <a:p>
-            <a:r>
-              <a:rPr lang="en-US" sz="1200" dirty="0"/>
-              <a:t>pm10_yesterday_max_class</a:t>
-            </a:r>
-          </a:p>
-          <a:p>
-            <a:r>
-              <a:rPr lang="en-US" sz="1200" dirty="0"/>
-              <a:t>no2_today_min_limit</a:t>
-            </a:r>
-          </a:p>
-          <a:p>
-            <a:r>
-              <a:rPr lang="en-US" sz="1200" dirty="0"/>
-              <a:t>no2_yesterday_min_class</a:t>
-            </a:r>
-          </a:p>
-          <a:p>
-            <a:r>
-              <a:rPr lang="en-US" sz="1200" dirty="0"/>
-              <a:t>o3_yesterday_latest_ts</a:t>
-            </a:r>
-          </a:p>
-          <a:p>
-            <a:r>
-              <a:rPr lang="en-US" sz="1200" dirty="0" err="1"/>
-              <a:t>luqx_today_max_ts</a:t>
-            </a:r>
-            <a:endParaRPr lang="en-US" sz="1200" dirty="0"/>
-          </a:p>
-          <a:p>
-            <a:r>
-              <a:rPr lang="en-US" sz="1200" dirty="0" err="1"/>
-              <a:t>lat</a:t>
-            </a:r>
-            <a:endParaRPr lang="en-US" sz="1200" dirty="0"/>
-          </a:p>
-          <a:p>
-            <a:r>
-              <a:rPr lang="en-US" sz="1200" dirty="0"/>
-              <a:t>pm10_today_latest_class</a:t>
-            </a:r>
           </a:p>
         </p:txBody>
       </p:sp>
     </p:spTree>
     <p:extLst>
       <p:ext uri="{BB962C8B-B14F-4D97-AF65-F5344CB8AC3E}">
-        <p14:creationId xmlns:p14="http://schemas.microsoft.com/office/powerpoint/2010/main" val="3507160755"/>
+        <p14:creationId xmlns:p14="http://schemas.microsoft.com/office/powerpoint/2010/main" val="2152663588"/>
       </p:ext>
     </p:extLst>
   </p:cSld>
@@ -15747,6 +15575,330 @@
           <p:cNvPr id="5" name="Foliennummernplatzhalter 4">
             <a:extLst>
               <a:ext uri="{FF2B5EF4-FFF2-40B4-BE49-F238E27FC236}">
+                <a16:creationId xmlns:a16="http://schemas.microsoft.com/office/drawing/2014/main" id="{3147EB66-A9FB-49E5-9E3A-54D7C7017958}"/>
+              </a:ext>
+            </a:extLst>
+          </p:cNvPr>
+          <p:cNvSpPr>
+            <a:spLocks noGrp="1"/>
+          </p:cNvSpPr>
+          <p:nvPr>
+            <p:ph type="sldNum" sz="quarter" idx="12"/>
+          </p:nvPr>
+        </p:nvSpPr>
+        <p:spPr/>
+        <p:txBody>
+          <a:bodyPr/>
+          <a:lstStyle/>
+          <a:p>
+            <a:fld id="{4AF462F5-4F09-48D4-8215-EEFD64917372}" type="slidenum">
+              <a:rPr lang="en-DE" smtClean="0"/>
+              <a:t>24</a:t>
+            </a:fld>
+            <a:endParaRPr lang="en-DE"/>
+          </a:p>
+        </p:txBody>
+      </p:sp>
+      <p:sp>
+        <p:nvSpPr>
+          <p:cNvPr id="6" name="Textfeld 5">
+            <a:extLst>
+              <a:ext uri="{FF2B5EF4-FFF2-40B4-BE49-F238E27FC236}">
+                <a16:creationId xmlns:a16="http://schemas.microsoft.com/office/drawing/2014/main" id="{9FB39698-5A04-4CD9-B5B3-6D3A19F1D99A}"/>
+              </a:ext>
+            </a:extLst>
+          </p:cNvPr>
+          <p:cNvSpPr txBox="1"/>
+          <p:nvPr/>
+        </p:nvSpPr>
+        <p:spPr>
+          <a:xfrm>
+            <a:off x="838200" y="0"/>
+            <a:ext cx="5540298" cy="6924973"/>
+          </a:xfrm>
+          <a:prstGeom prst="rect">
+            <a:avLst/>
+          </a:prstGeom>
+          <a:noFill/>
+        </p:spPr>
+        <p:txBody>
+          <a:bodyPr wrap="square" rtlCol="0">
+            <a:spAutoFit/>
+          </a:bodyPr>
+          <a:lstStyle/>
+          <a:p>
+            <a:r>
+              <a:rPr lang="en-US" sz="1200" dirty="0" err="1"/>
+              <a:t>luqx_today_latest</a:t>
+            </a:r>
+            <a:endParaRPr lang="en-US" sz="1200" dirty="0"/>
+          </a:p>
+          <a:p>
+            <a:r>
+              <a:rPr lang="en-US" sz="1200" dirty="0"/>
+              <a:t>pm10_today_min</a:t>
+            </a:r>
+          </a:p>
+          <a:p>
+            <a:r>
+              <a:rPr lang="en-US" sz="1200" dirty="0" err="1"/>
+              <a:t>lon</a:t>
+            </a:r>
+            <a:endParaRPr lang="en-US" sz="1200" dirty="0"/>
+          </a:p>
+          <a:p>
+            <a:r>
+              <a:rPr lang="en-US" sz="1200" dirty="0"/>
+              <a:t>pm10_h_today_min</a:t>
+            </a:r>
+          </a:p>
+          <a:p>
+            <a:r>
+              <a:rPr lang="en-US" sz="1200" dirty="0"/>
+              <a:t>no2_today_avg_class</a:t>
+            </a:r>
+          </a:p>
+          <a:p>
+            <a:r>
+              <a:rPr lang="en-US" sz="1200" dirty="0" err="1"/>
+              <a:t>luqx_today_max</a:t>
+            </a:r>
+            <a:endParaRPr lang="en-US" sz="1200" dirty="0"/>
+          </a:p>
+          <a:p>
+            <a:r>
+              <a:rPr lang="en-US" sz="1200" dirty="0"/>
+              <a:t>pm10_today_avg_class</a:t>
+            </a:r>
+          </a:p>
+          <a:p>
+            <a:r>
+              <a:rPr lang="en-US" sz="1200" dirty="0"/>
+              <a:t>o3_today_avg</a:t>
+            </a:r>
+          </a:p>
+          <a:p>
+            <a:r>
+              <a:rPr lang="en-US" sz="1200" dirty="0" err="1"/>
+              <a:t>keyattname</a:t>
+            </a:r>
+            <a:endParaRPr lang="en-US" sz="1200" dirty="0"/>
+          </a:p>
+          <a:p>
+            <a:r>
+              <a:rPr lang="en-US" sz="1200" dirty="0" err="1"/>
+              <a:t>luqx_yesterday_max_ts</a:t>
+            </a:r>
+            <a:endParaRPr lang="en-US" sz="1200" dirty="0"/>
+          </a:p>
+          <a:p>
+            <a:r>
+              <a:rPr lang="en-US" sz="1200" dirty="0" err="1"/>
+              <a:t>kurzname</a:t>
+            </a:r>
+            <a:endParaRPr lang="en-US" sz="1200" dirty="0"/>
+          </a:p>
+          <a:p>
+            <a:r>
+              <a:rPr lang="en-US" sz="1200" dirty="0"/>
+              <a:t>o3_yesterday_max</a:t>
+            </a:r>
+          </a:p>
+          <a:p>
+            <a:r>
+              <a:rPr lang="en-US" sz="1200" dirty="0" err="1"/>
+              <a:t>yesterday_ts</a:t>
+            </a:r>
+            <a:endParaRPr lang="en-US" sz="1200" dirty="0"/>
+          </a:p>
+          <a:p>
+            <a:r>
+              <a:rPr lang="en-US" sz="1200" dirty="0"/>
+              <a:t>pm10_yesterday_min</a:t>
+            </a:r>
+          </a:p>
+          <a:p>
+            <a:r>
+              <a:rPr lang="en-US" sz="1200" dirty="0"/>
+              <a:t>pm10_h_yesterday_max_class</a:t>
+            </a:r>
+          </a:p>
+          <a:p>
+            <a:r>
+              <a:rPr lang="en-US" sz="1200" dirty="0"/>
+              <a:t>pm25_h_yesterday_max_class</a:t>
+            </a:r>
+          </a:p>
+          <a:p>
+            <a:r>
+              <a:rPr lang="en-US" sz="1200" dirty="0"/>
+              <a:t>pm25_yesterday_min</a:t>
+            </a:r>
+          </a:p>
+          <a:p>
+            <a:r>
+              <a:rPr lang="en-US" sz="1200" dirty="0"/>
+              <a:t>no2_today_max_limit</a:t>
+            </a:r>
+          </a:p>
+          <a:p>
+            <a:r>
+              <a:rPr lang="en-US" sz="1200" dirty="0"/>
+              <a:t>pm10_h_today_min_class</a:t>
+            </a:r>
+          </a:p>
+          <a:p>
+            <a:r>
+              <a:rPr lang="en-US" sz="1200" dirty="0"/>
+              <a:t>pm25_today_max_class</a:t>
+            </a:r>
+          </a:p>
+          <a:p>
+            <a:r>
+              <a:rPr lang="en-US" sz="1200" dirty="0"/>
+              <a:t>pm10_today_max_class</a:t>
+            </a:r>
+          </a:p>
+          <a:p>
+            <a:r>
+              <a:rPr lang="en-US" sz="1200" dirty="0"/>
+              <a:t>o3_yesterday_min_class</a:t>
+            </a:r>
+          </a:p>
+          <a:p>
+            <a:r>
+              <a:rPr lang="en-US" sz="1200" dirty="0"/>
+              <a:t>pm25_h_yesterday_avg_class</a:t>
+            </a:r>
+          </a:p>
+          <a:p>
+            <a:r>
+              <a:rPr lang="en-US" sz="1200" dirty="0"/>
+              <a:t>pm10_today_latest</a:t>
+            </a:r>
+          </a:p>
+          <a:p>
+            <a:r>
+              <a:rPr lang="en-US" sz="1200" dirty="0"/>
+              <a:t>pm25_h_today_latest</a:t>
+            </a:r>
+          </a:p>
+          <a:p>
+            <a:r>
+              <a:rPr lang="en-US" sz="1200" dirty="0" err="1"/>
+              <a:t>luqx_today_max_ts_raw</a:t>
+            </a:r>
+            <a:endParaRPr lang="en-US" sz="1200" dirty="0"/>
+          </a:p>
+          <a:p>
+            <a:r>
+              <a:rPr lang="en-US" sz="1200" dirty="0"/>
+              <a:t>no2_today_latest_ts</a:t>
+            </a:r>
+          </a:p>
+          <a:p>
+            <a:r>
+              <a:rPr lang="en-US" sz="1200" dirty="0"/>
+              <a:t>pm25_today_latest</a:t>
+            </a:r>
+          </a:p>
+          <a:p>
+            <a:r>
+              <a:rPr lang="en-US" sz="1200" dirty="0" err="1"/>
+              <a:t>statkenn</a:t>
+            </a:r>
+            <a:endParaRPr lang="en-US" sz="1200" dirty="0"/>
+          </a:p>
+          <a:p>
+            <a:r>
+              <a:rPr lang="en-US" sz="1200" dirty="0"/>
+              <a:t>pm25_h_yesterday_min_class</a:t>
+            </a:r>
+          </a:p>
+          <a:p>
+            <a:r>
+              <a:rPr lang="en-US" sz="1200" dirty="0"/>
+              <a:t>pm10_yesterday_max_class</a:t>
+            </a:r>
+          </a:p>
+          <a:p>
+            <a:r>
+              <a:rPr lang="en-US" sz="1200" dirty="0"/>
+              <a:t>no2_today_min_limit</a:t>
+            </a:r>
+          </a:p>
+          <a:p>
+            <a:r>
+              <a:rPr lang="en-US" sz="1200" dirty="0"/>
+              <a:t>no2_yesterday_min_class</a:t>
+            </a:r>
+          </a:p>
+          <a:p>
+            <a:r>
+              <a:rPr lang="en-US" sz="1200" dirty="0"/>
+              <a:t>o3_yesterday_latest_ts</a:t>
+            </a:r>
+          </a:p>
+          <a:p>
+            <a:r>
+              <a:rPr lang="en-US" sz="1200" dirty="0" err="1"/>
+              <a:t>luqx_today_max_ts</a:t>
+            </a:r>
+            <a:endParaRPr lang="en-US" sz="1200" dirty="0"/>
+          </a:p>
+          <a:p>
+            <a:r>
+              <a:rPr lang="en-US" sz="1200" dirty="0" err="1"/>
+              <a:t>lat</a:t>
+            </a:r>
+            <a:endParaRPr lang="en-US" sz="1200" dirty="0"/>
+          </a:p>
+          <a:p>
+            <a:r>
+              <a:rPr lang="en-US" sz="1200" dirty="0"/>
+              <a:t>pm10_today_latest_class</a:t>
+            </a:r>
+          </a:p>
+        </p:txBody>
+      </p:sp>
+    </p:spTree>
+    <p:extLst>
+      <p:ext uri="{BB962C8B-B14F-4D97-AF65-F5344CB8AC3E}">
+        <p14:creationId xmlns:p14="http://schemas.microsoft.com/office/powerpoint/2010/main" val="3507160755"/>
+      </p:ext>
+    </p:extLst>
+  </p:cSld>
+  <p:clrMapOvr>
+    <a:masterClrMapping/>
+  </p:clrMapOvr>
+  <p:transition spd="slow">
+    <p:push dir="u"/>
+  </p:transition>
+</p:sld>
+</file>
+
+<file path=ppt/slides/slide25.xml><?xml version="1.0" encoding="utf-8"?>
+<p:sld xmlns:a="http://schemas.openxmlformats.org/drawingml/2006/main" xmlns:r="http://schemas.openxmlformats.org/officeDocument/2006/relationships" xmlns:p="http://schemas.openxmlformats.org/presentationml/2006/main">
+  <p:cSld>
+    <p:spTree>
+      <p:nvGrpSpPr>
+        <p:cNvPr id="1" name=""/>
+        <p:cNvGrpSpPr/>
+        <p:nvPr/>
+      </p:nvGrpSpPr>
+      <p:grpSpPr>
+        <a:xfrm>
+          <a:off x="0" y="0"/>
+          <a:ext cx="0" cy="0"/>
+          <a:chOff x="0" y="0"/>
+          <a:chExt cx="0" cy="0"/>
+        </a:xfrm>
+      </p:grpSpPr>
+      <p:sp>
+        <p:nvSpPr>
+          <p:cNvPr id="5" name="Foliennummernplatzhalter 4">
+            <a:extLst>
+              <a:ext uri="{FF2B5EF4-FFF2-40B4-BE49-F238E27FC236}">
                 <a16:creationId xmlns:a16="http://schemas.microsoft.com/office/drawing/2014/main" id="{0A562B38-910A-48EE-95BD-853336B6DE50}"/>
               </a:ext>
             </a:extLst>
@@ -15765,7 +15917,7 @@
           <a:p>
             <a:fld id="{4AF462F5-4F09-48D4-8215-EEFD64917372}" type="slidenum">
               <a:rPr lang="en-DE" smtClean="0"/>
-              <a:t>24</a:t>
+              <a:t>25</a:t>
             </a:fld>
             <a:endParaRPr lang="en-DE"/>
           </a:p>
@@ -17679,7 +17831,7 @@
           <a:graphicData uri="http://schemas.openxmlformats.org/presentationml/2006/ole">
             <mc:AlternateContent xmlns:mc="http://schemas.openxmlformats.org/markup-compatibility/2006">
               <mc:Choice xmlns:v="urn:schemas-microsoft-com:vml" Requires="v">
-                <p:oleObj spid="_x0000_s14350" name="Document" r:id="rId4" imgW="5731560" imgH="3728880" progId="Word.OpenDocumentText.12">
+                <p:oleObj spid="_x0000_s14352" name="Document" r:id="rId4" imgW="5731560" imgH="3728880" progId="Word.OpenDocumentText.12">
                   <p:embed/>
                 </p:oleObj>
               </mc:Choice>
@@ -18422,7 +18574,7 @@
           <a:graphicData uri="http://schemas.openxmlformats.org/presentationml/2006/ole">
             <mc:AlternateContent xmlns:mc="http://schemas.openxmlformats.org/markup-compatibility/2006">
               <mc:Choice xmlns:v="urn:schemas-microsoft-com:vml" Requires="v">
-                <p:oleObj spid="_x0000_s16389" name="Document" r:id="rId5" imgW="5731560" imgH="3728880" progId="Word.OpenDocumentText.12">
+                <p:oleObj spid="_x0000_s16391" name="Document" r:id="rId5" imgW="5731560" imgH="3728880" progId="Word.OpenDocumentText.12">
                   <p:embed/>
                 </p:oleObj>
               </mc:Choice>

</xml_diff>